<commit_message>
Update slides with game analysis with 2 missing slides
player journey
description of part of the story

also some typo fixed and speelcheck improved
</commit_message>
<xml_diff>
--- a/s9/projektowanie-gier-komputerowych-2/rozkladanie-gry/Formatka rozkładania gry (2019) - grupowa.pptx
+++ b/s9/projektowanie-gier-komputerowych-2/rozkladanie-gry/Formatka rozkładania gry (2019) - grupowa.pptx
@@ -162,7 +162,7 @@
 
 <file path=ppt/commentAuthors.xml><?xml version="1.0" encoding="utf-8"?>
 <p:cmAuthorLst xmlns:a="http://schemas.openxmlformats.org/drawingml/2006/main" xmlns:r="http://schemas.openxmlformats.org/officeDocument/2006/relationships" xmlns:p="http://schemas.openxmlformats.org/presentationml/2006/main">
-  <p:cmAuthor id="1" name="Bartosz Rodziewicz" initials="BR" lastIdx="2" clrIdx="0">
+  <p:cmAuthor id="1" name="Bartosz Rodziewicz" initials="BR" lastIdx="8" clrIdx="0">
     <p:extLst>
       <p:ext uri="{19B8F6BF-5375-455C-9EA6-DF929625EA0E}">
         <p15:presenceInfo xmlns:p15="http://schemas.microsoft.com/office/powerpoint/2012/main" userId="d82e455771f5ad08" providerId="Windows Live"/>
@@ -175,16 +175,37 @@
 <file path=ppt/revisionInfo.xml><?xml version="1.0" encoding="utf-8"?>
 <p1510:revInfo xmlns:a="http://schemas.openxmlformats.org/drawingml/2006/main" xmlns:r="http://schemas.openxmlformats.org/officeDocument/2006/relationships" xmlns:p1510="http://schemas.microsoft.com/office/powerpoint/2015/10/main">
   <p1510:revLst>
-    <p1510:client id="{361916C7-5B4B-491D-B5E4-FC8F79D9BECC}" v="4304" dt="2019-11-21T12:49:51.063"/>
-    <p1510:client id="{7E24D64C-0E8B-474B-B1CB-D347BB04F464}" v="4" dt="2019-11-21T11:22:54.157"/>
-    <p1510:client id="{86134D3F-58A3-43B9-AA87-820A6F778E19}" v="3027" dt="2019-11-21T12:48:40.978"/>
-    <p1510:client id="{C108C111-2244-4846-AD5F-B97CA58E7EEE}" v="1165" dt="2019-11-21T11:49:54.294"/>
+    <p1510:client id="{F5D64456-235D-4AE8-A862-E77A6539DEA5}" v="72" dt="2019-12-05T10:53:33.555"/>
   </p1510:revLst>
 </p1510:revInfo>
 </file>
 
 <file path=ppt/changesInfos/changesInfo1.xml><?xml version="1.0" encoding="utf-8"?>
 <pc:chgInfo xmlns:a="http://schemas.openxmlformats.org/drawingml/2006/main" xmlns:r="http://schemas.openxmlformats.org/officeDocument/2006/relationships" xmlns:ac="http://schemas.microsoft.com/office/drawing/2013/main/command" xmlns:pc="http://schemas.microsoft.com/office/powerpoint/2013/main/command">
+  <pc:docChgLst>
+    <pc:chgData name="Mikołaj Brukiewicz" userId="0886648156fb1e55" providerId="Windows Live" clId="Web-{7E24D64C-0E8B-474B-B1CB-D347BB04F464}"/>
+    <pc:docChg chg="modSld">
+      <pc:chgData name="Mikołaj Brukiewicz" userId="0886648156fb1e55" providerId="Windows Live" clId="Web-{7E24D64C-0E8B-474B-B1CB-D347BB04F464}" dt="2019-11-21T11:22:54.157" v="3" actId="20577"/>
+      <pc:docMkLst>
+        <pc:docMk/>
+      </pc:docMkLst>
+      <pc:sldChg chg="modSp">
+        <pc:chgData name="Mikołaj Brukiewicz" userId="0886648156fb1e55" providerId="Windows Live" clId="Web-{7E24D64C-0E8B-474B-B1CB-D347BB04F464}" dt="2019-11-21T11:22:54.141" v="2" actId="20577"/>
+        <pc:sldMkLst>
+          <pc:docMk/>
+          <pc:sldMk cId="2594758044" sldId="451"/>
+        </pc:sldMkLst>
+        <pc:spChg chg="mod">
+          <ac:chgData name="Mikołaj Brukiewicz" userId="0886648156fb1e55" providerId="Windows Live" clId="Web-{7E24D64C-0E8B-474B-B1CB-D347BB04F464}" dt="2019-11-21T11:22:54.141" v="2" actId="20577"/>
+          <ac:spMkLst>
+            <pc:docMk/>
+            <pc:sldMk cId="2594758044" sldId="451"/>
+            <ac:spMk id="3" creationId="{00000000-0000-0000-0000-000000000000}"/>
+          </ac:spMkLst>
+        </pc:spChg>
+      </pc:sldChg>
+    </pc:docChg>
+  </pc:docChgLst>
   <pc:docChgLst>
     <pc:chgData name="Bartosz Rodziewicz" userId="d82e455771f5ad08" providerId="Windows Live" clId="Web-{C108C111-2244-4846-AD5F-B97CA58E7EEE}"/>
     <pc:docChg chg="addSld modSld">
@@ -348,6 +369,240 @@
           <pc:docMk/>
           <pc:sldMk cId="2144579590" sldId="481"/>
         </pc:sldMkLst>
+      </pc:sldChg>
+    </pc:docChg>
+  </pc:docChgLst>
+  <pc:docChgLst>
+    <pc:chgData name="Mikołaj Brukiewicz" userId="0886648156fb1e55" providerId="LiveId" clId="{86134D3F-58A3-43B9-AA87-820A6F778E19}"/>
+    <pc:docChg chg="undo custSel modSld">
+      <pc:chgData name="Mikołaj Brukiewicz" userId="0886648156fb1e55" providerId="LiveId" clId="{86134D3F-58A3-43B9-AA87-820A6F778E19}" dt="2019-11-21T12:48:40.978" v="3027" actId="207"/>
+      <pc:docMkLst>
+        <pc:docMk/>
+      </pc:docMkLst>
+      <pc:sldChg chg="modSp">
+        <pc:chgData name="Mikołaj Brukiewicz" userId="0886648156fb1e55" providerId="LiveId" clId="{86134D3F-58A3-43B9-AA87-820A6F778E19}" dt="2019-11-21T11:24:02.690" v="58" actId="20577"/>
+        <pc:sldMkLst>
+          <pc:docMk/>
+          <pc:sldMk cId="0" sldId="256"/>
+        </pc:sldMkLst>
+        <pc:spChg chg="mod">
+          <ac:chgData name="Mikołaj Brukiewicz" userId="0886648156fb1e55" providerId="LiveId" clId="{86134D3F-58A3-43B9-AA87-820A6F778E19}" dt="2019-11-21T11:24:02.690" v="58" actId="20577"/>
+          <ac:spMkLst>
+            <pc:docMk/>
+            <pc:sldMk cId="0" sldId="256"/>
+            <ac:spMk id="2" creationId="{00000000-0000-0000-0000-000000000000}"/>
+          </ac:spMkLst>
+        </pc:spChg>
+      </pc:sldChg>
+      <pc:sldChg chg="modSp">
+        <pc:chgData name="Mikołaj Brukiewicz" userId="0886648156fb1e55" providerId="LiveId" clId="{86134D3F-58A3-43B9-AA87-820A6F778E19}" dt="2019-11-21T11:49:22.506" v="1305" actId="5793"/>
+        <pc:sldMkLst>
+          <pc:docMk/>
+          <pc:sldMk cId="2362418509" sldId="422"/>
+        </pc:sldMkLst>
+        <pc:graphicFrameChg chg="modGraphic">
+          <ac:chgData name="Mikołaj Brukiewicz" userId="0886648156fb1e55" providerId="LiveId" clId="{86134D3F-58A3-43B9-AA87-820A6F778E19}" dt="2019-11-21T11:49:22.506" v="1305" actId="5793"/>
+          <ac:graphicFrameMkLst>
+            <pc:docMk/>
+            <pc:sldMk cId="2362418509" sldId="422"/>
+            <ac:graphicFrameMk id="8" creationId="{120EA9A7-2253-49C6-9DFF-1E67F36D4AD9}"/>
+          </ac:graphicFrameMkLst>
+        </pc:graphicFrameChg>
+      </pc:sldChg>
+      <pc:sldChg chg="modSp">
+        <pc:chgData name="Mikołaj Brukiewicz" userId="0886648156fb1e55" providerId="LiveId" clId="{86134D3F-58A3-43B9-AA87-820A6F778E19}" dt="2019-11-21T11:26:50.952" v="99" actId="20577"/>
+        <pc:sldMkLst>
+          <pc:docMk/>
+          <pc:sldMk cId="3608818552" sldId="444"/>
+        </pc:sldMkLst>
+        <pc:spChg chg="mod">
+          <ac:chgData name="Mikołaj Brukiewicz" userId="0886648156fb1e55" providerId="LiveId" clId="{86134D3F-58A3-43B9-AA87-820A6F778E19}" dt="2019-11-21T11:26:50.952" v="99" actId="20577"/>
+          <ac:spMkLst>
+            <pc:docMk/>
+            <pc:sldMk cId="3608818552" sldId="444"/>
+            <ac:spMk id="3" creationId="{00000000-0000-0000-0000-000000000000}"/>
+          </ac:spMkLst>
+        </pc:spChg>
+      </pc:sldChg>
+      <pc:sldChg chg="modSp">
+        <pc:chgData name="Mikołaj Brukiewicz" userId="0886648156fb1e55" providerId="LiveId" clId="{86134D3F-58A3-43B9-AA87-820A6F778E19}" dt="2019-11-21T11:23:05.498" v="24" actId="20577"/>
+        <pc:sldMkLst>
+          <pc:docMk/>
+          <pc:sldMk cId="2594758044" sldId="451"/>
+        </pc:sldMkLst>
+        <pc:spChg chg="mod">
+          <ac:chgData name="Mikołaj Brukiewicz" userId="0886648156fb1e55" providerId="LiveId" clId="{86134D3F-58A3-43B9-AA87-820A6F778E19}" dt="2019-11-21T11:23:05.498" v="24" actId="20577"/>
+          <ac:spMkLst>
+            <pc:docMk/>
+            <pc:sldMk cId="2594758044" sldId="451"/>
+            <ac:spMk id="3" creationId="{00000000-0000-0000-0000-000000000000}"/>
+          </ac:spMkLst>
+        </pc:spChg>
+      </pc:sldChg>
+      <pc:sldChg chg="modSp">
+        <pc:chgData name="Mikołaj Brukiewicz" userId="0886648156fb1e55" providerId="LiveId" clId="{86134D3F-58A3-43B9-AA87-820A6F778E19}" dt="2019-11-21T12:04:56.625" v="1823" actId="20577"/>
+        <pc:sldMkLst>
+          <pc:docMk/>
+          <pc:sldMk cId="4262534782" sldId="453"/>
+        </pc:sldMkLst>
+        <pc:spChg chg="mod">
+          <ac:chgData name="Mikołaj Brukiewicz" userId="0886648156fb1e55" providerId="LiveId" clId="{86134D3F-58A3-43B9-AA87-820A6F778E19}" dt="2019-11-21T12:04:56.625" v="1823" actId="20577"/>
+          <ac:spMkLst>
+            <pc:docMk/>
+            <pc:sldMk cId="4262534782" sldId="453"/>
+            <ac:spMk id="3" creationId="{00000000-0000-0000-0000-000000000000}"/>
+          </ac:spMkLst>
+        </pc:spChg>
+      </pc:sldChg>
+      <pc:sldChg chg="modSp">
+        <pc:chgData name="Mikołaj Brukiewicz" userId="0886648156fb1e55" providerId="LiveId" clId="{86134D3F-58A3-43B9-AA87-820A6F778E19}" dt="2019-11-21T11:37:13.088" v="720" actId="207"/>
+        <pc:sldMkLst>
+          <pc:docMk/>
+          <pc:sldMk cId="3114265317" sldId="455"/>
+        </pc:sldMkLst>
+        <pc:spChg chg="mod">
+          <ac:chgData name="Mikołaj Brukiewicz" userId="0886648156fb1e55" providerId="LiveId" clId="{86134D3F-58A3-43B9-AA87-820A6F778E19}" dt="2019-11-21T11:37:13.088" v="720" actId="207"/>
+          <ac:spMkLst>
+            <pc:docMk/>
+            <pc:sldMk cId="3114265317" sldId="455"/>
+            <ac:spMk id="3" creationId="{00000000-0000-0000-0000-000000000000}"/>
+          </ac:spMkLst>
+        </pc:spChg>
+      </pc:sldChg>
+      <pc:sldChg chg="modSp">
+        <pc:chgData name="Mikołaj Brukiewicz" userId="0886648156fb1e55" providerId="LiveId" clId="{86134D3F-58A3-43B9-AA87-820A6F778E19}" dt="2019-11-21T11:45:23.062" v="1098" actId="20577"/>
+        <pc:sldMkLst>
+          <pc:docMk/>
+          <pc:sldMk cId="3708081354" sldId="457"/>
+        </pc:sldMkLst>
+        <pc:spChg chg="mod">
+          <ac:chgData name="Mikołaj Brukiewicz" userId="0886648156fb1e55" providerId="LiveId" clId="{86134D3F-58A3-43B9-AA87-820A6F778E19}" dt="2019-11-21T11:45:23.062" v="1098" actId="20577"/>
+          <ac:spMkLst>
+            <pc:docMk/>
+            <pc:sldMk cId="3708081354" sldId="457"/>
+            <ac:spMk id="3" creationId="{00000000-0000-0000-0000-000000000000}"/>
+          </ac:spMkLst>
+        </pc:spChg>
+      </pc:sldChg>
+      <pc:sldChg chg="modSp">
+        <pc:chgData name="Mikołaj Brukiewicz" userId="0886648156fb1e55" providerId="LiveId" clId="{86134D3F-58A3-43B9-AA87-820A6F778E19}" dt="2019-11-21T11:27:23.092" v="101" actId="20577"/>
+        <pc:sldMkLst>
+          <pc:docMk/>
+          <pc:sldMk cId="1643076518" sldId="459"/>
+        </pc:sldMkLst>
+        <pc:spChg chg="mod">
+          <ac:chgData name="Mikołaj Brukiewicz" userId="0886648156fb1e55" providerId="LiveId" clId="{86134D3F-58A3-43B9-AA87-820A6F778E19}" dt="2019-11-21T11:27:23.092" v="101" actId="20577"/>
+          <ac:spMkLst>
+            <pc:docMk/>
+            <pc:sldMk cId="1643076518" sldId="459"/>
+            <ac:spMk id="3" creationId="{00000000-0000-0000-0000-000000000000}"/>
+          </ac:spMkLst>
+        </pc:spChg>
+      </pc:sldChg>
+      <pc:sldChg chg="modSp">
+        <pc:chgData name="Mikołaj Brukiewicz" userId="0886648156fb1e55" providerId="LiveId" clId="{86134D3F-58A3-43B9-AA87-820A6F778E19}" dt="2019-11-21T11:50:03.068" v="1392" actId="207"/>
+        <pc:sldMkLst>
+          <pc:docMk/>
+          <pc:sldMk cId="3521595124" sldId="462"/>
+        </pc:sldMkLst>
+        <pc:spChg chg="mod">
+          <ac:chgData name="Mikołaj Brukiewicz" userId="0886648156fb1e55" providerId="LiveId" clId="{86134D3F-58A3-43B9-AA87-820A6F778E19}" dt="2019-11-21T11:50:03.068" v="1392" actId="207"/>
+          <ac:spMkLst>
+            <pc:docMk/>
+            <pc:sldMk cId="3521595124" sldId="462"/>
+            <ac:spMk id="3" creationId="{00000000-0000-0000-0000-000000000000}"/>
+          </ac:spMkLst>
+        </pc:spChg>
+      </pc:sldChg>
+      <pc:sldChg chg="modSp">
+        <pc:chgData name="Mikołaj Brukiewicz" userId="0886648156fb1e55" providerId="LiveId" clId="{86134D3F-58A3-43B9-AA87-820A6F778E19}" dt="2019-11-21T12:26:36.941" v="2334" actId="20577"/>
+        <pc:sldMkLst>
+          <pc:docMk/>
+          <pc:sldMk cId="3201811108" sldId="465"/>
+        </pc:sldMkLst>
+        <pc:spChg chg="mod">
+          <ac:chgData name="Mikołaj Brukiewicz" userId="0886648156fb1e55" providerId="LiveId" clId="{86134D3F-58A3-43B9-AA87-820A6F778E19}" dt="2019-11-21T12:26:36.941" v="2334" actId="20577"/>
+          <ac:spMkLst>
+            <pc:docMk/>
+            <pc:sldMk cId="3201811108" sldId="465"/>
+            <ac:spMk id="3" creationId="{00000000-0000-0000-0000-000000000000}"/>
+          </ac:spMkLst>
+        </pc:spChg>
+      </pc:sldChg>
+      <pc:sldChg chg="modSp">
+        <pc:chgData name="Mikołaj Brukiewicz" userId="0886648156fb1e55" providerId="LiveId" clId="{86134D3F-58A3-43B9-AA87-820A6F778E19}" dt="2019-11-21T12:14:37.636" v="2090" actId="207"/>
+        <pc:sldMkLst>
+          <pc:docMk/>
+          <pc:sldMk cId="2725443881" sldId="467"/>
+        </pc:sldMkLst>
+        <pc:spChg chg="mod">
+          <ac:chgData name="Mikołaj Brukiewicz" userId="0886648156fb1e55" providerId="LiveId" clId="{86134D3F-58A3-43B9-AA87-820A6F778E19}" dt="2019-11-21T12:14:37.636" v="2090" actId="207"/>
+          <ac:spMkLst>
+            <pc:docMk/>
+            <pc:sldMk cId="2725443881" sldId="467"/>
+            <ac:spMk id="3" creationId="{00000000-0000-0000-0000-000000000000}"/>
+          </ac:spMkLst>
+        </pc:spChg>
+      </pc:sldChg>
+      <pc:sldChg chg="modSp">
+        <pc:chgData name="Mikołaj Brukiewicz" userId="0886648156fb1e55" providerId="LiveId" clId="{86134D3F-58A3-43B9-AA87-820A6F778E19}" dt="2019-11-21T12:31:54.182" v="2506" actId="207"/>
+        <pc:sldMkLst>
+          <pc:docMk/>
+          <pc:sldMk cId="135983384" sldId="468"/>
+        </pc:sldMkLst>
+        <pc:spChg chg="mod">
+          <ac:chgData name="Mikołaj Brukiewicz" userId="0886648156fb1e55" providerId="LiveId" clId="{86134D3F-58A3-43B9-AA87-820A6F778E19}" dt="2019-11-21T12:31:54.182" v="2506" actId="207"/>
+          <ac:spMkLst>
+            <pc:docMk/>
+            <pc:sldMk cId="135983384" sldId="468"/>
+            <ac:spMk id="3" creationId="{00000000-0000-0000-0000-000000000000}"/>
+          </ac:spMkLst>
+        </pc:spChg>
+      </pc:sldChg>
+      <pc:sldChg chg="modSp">
+        <pc:chgData name="Mikołaj Brukiewicz" userId="0886648156fb1e55" providerId="LiveId" clId="{86134D3F-58A3-43B9-AA87-820A6F778E19}" dt="2019-11-21T12:48:40.978" v="3027" actId="207"/>
+        <pc:sldMkLst>
+          <pc:docMk/>
+          <pc:sldMk cId="2327819680" sldId="469"/>
+        </pc:sldMkLst>
+        <pc:spChg chg="mod">
+          <ac:chgData name="Mikołaj Brukiewicz" userId="0886648156fb1e55" providerId="LiveId" clId="{86134D3F-58A3-43B9-AA87-820A6F778E19}" dt="2019-11-21T12:48:40.978" v="3027" actId="207"/>
+          <ac:spMkLst>
+            <pc:docMk/>
+            <pc:sldMk cId="2327819680" sldId="469"/>
+            <ac:spMk id="3" creationId="{00000000-0000-0000-0000-000000000000}"/>
+          </ac:spMkLst>
+        </pc:spChg>
+      </pc:sldChg>
+      <pc:sldChg chg="modSp">
+        <pc:chgData name="Mikołaj Brukiewicz" userId="0886648156fb1e55" providerId="LiveId" clId="{86134D3F-58A3-43B9-AA87-820A6F778E19}" dt="2019-11-21T11:54:47.845" v="1820" actId="20578"/>
+        <pc:sldMkLst>
+          <pc:docMk/>
+          <pc:sldMk cId="2482326161" sldId="471"/>
+        </pc:sldMkLst>
+        <pc:spChg chg="mod">
+          <ac:chgData name="Mikołaj Brukiewicz" userId="0886648156fb1e55" providerId="LiveId" clId="{86134D3F-58A3-43B9-AA87-820A6F778E19}" dt="2019-11-21T11:54:47.845" v="1820" actId="20578"/>
+          <ac:spMkLst>
+            <pc:docMk/>
+            <pc:sldMk cId="2482326161" sldId="471"/>
+            <ac:spMk id="3" creationId="{00000000-0000-0000-0000-000000000000}"/>
+          </ac:spMkLst>
+        </pc:spChg>
+      </pc:sldChg>
+      <pc:sldChg chg="modSp">
+        <pc:chgData name="Mikołaj Brukiewicz" userId="0886648156fb1e55" providerId="LiveId" clId="{86134D3F-58A3-43B9-AA87-820A6F778E19}" dt="2019-11-21T12:37:12.396" v="2700" actId="207"/>
+        <pc:sldMkLst>
+          <pc:docMk/>
+          <pc:sldMk cId="2661227332" sldId="475"/>
+        </pc:sldMkLst>
+        <pc:spChg chg="mod">
+          <ac:chgData name="Mikołaj Brukiewicz" userId="0886648156fb1e55" providerId="LiveId" clId="{86134D3F-58A3-43B9-AA87-820A6F778E19}" dt="2019-11-21T12:37:12.396" v="2700" actId="207"/>
+          <ac:spMkLst>
+            <pc:docMk/>
+            <pc:sldMk cId="2661227332" sldId="475"/>
+            <ac:spMk id="3" creationId="{00000000-0000-0000-0000-000000000000}"/>
+          </ac:spMkLst>
+        </pc:spChg>
       </pc:sldChg>
     </pc:docChg>
   </pc:docChgLst>
@@ -595,257 +850,187 @@
     </pc:docChg>
   </pc:docChgLst>
   <pc:docChgLst>
-    <pc:chgData name="Mikołaj Brukiewicz" userId="0886648156fb1e55" providerId="Windows Live" clId="Web-{7E24D64C-0E8B-474B-B1CB-D347BB04F464}"/>
-    <pc:docChg chg="modSld">
-      <pc:chgData name="Mikołaj Brukiewicz" userId="0886648156fb1e55" providerId="Windows Live" clId="Web-{7E24D64C-0E8B-474B-B1CB-D347BB04F464}" dt="2019-11-21T11:22:54.157" v="3" actId="20577"/>
+    <pc:chgData name="Bartosz Rodziewicz" userId="d82e455771f5ad08" providerId="LiveId" clId="{F5D64456-235D-4AE8-A862-E77A6539DEA5}"/>
+    <pc:docChg chg="undo custSel modSld">
+      <pc:chgData name="Bartosz Rodziewicz" userId="d82e455771f5ad08" providerId="LiveId" clId="{F5D64456-235D-4AE8-A862-E77A6539DEA5}" dt="2019-12-05T10:56:34.192" v="5309" actId="790"/>
       <pc:docMkLst>
         <pc:docMk/>
       </pc:docMkLst>
-      <pc:sldChg chg="modSp">
-        <pc:chgData name="Mikołaj Brukiewicz" userId="0886648156fb1e55" providerId="Windows Live" clId="Web-{7E24D64C-0E8B-474B-B1CB-D347BB04F464}" dt="2019-11-21T11:22:54.141" v="2" actId="20577"/>
+      <pc:sldChg chg="modSp addCm delCm">
+        <pc:chgData name="Bartosz Rodziewicz" userId="d82e455771f5ad08" providerId="LiveId" clId="{F5D64456-235D-4AE8-A862-E77A6539DEA5}" dt="2019-12-05T10:50:29.541" v="5225" actId="790"/>
         <pc:sldMkLst>
           <pc:docMk/>
-          <pc:sldMk cId="2594758044" sldId="451"/>
+          <pc:sldMk cId="960818353" sldId="460"/>
         </pc:sldMkLst>
         <pc:spChg chg="mod">
-          <ac:chgData name="Mikołaj Brukiewicz" userId="0886648156fb1e55" providerId="Windows Live" clId="Web-{7E24D64C-0E8B-474B-B1CB-D347BB04F464}" dt="2019-11-21T11:22:54.141" v="2" actId="20577"/>
+          <ac:chgData name="Bartosz Rodziewicz" userId="d82e455771f5ad08" providerId="LiveId" clId="{F5D64456-235D-4AE8-A862-E77A6539DEA5}" dt="2019-12-05T10:50:29.541" v="5225" actId="790"/>
           <ac:spMkLst>
             <pc:docMk/>
-            <pc:sldMk cId="2594758044" sldId="451"/>
+            <pc:sldMk cId="960818353" sldId="460"/>
             <ac:spMk id="3" creationId="{00000000-0000-0000-0000-000000000000}"/>
           </ac:spMkLst>
         </pc:spChg>
       </pc:sldChg>
-    </pc:docChg>
-  </pc:docChgLst>
-  <pc:docChgLst>
-    <pc:chgData name="Mikołaj Brukiewicz" userId="0886648156fb1e55" providerId="LiveId" clId="{86134D3F-58A3-43B9-AA87-820A6F778E19}"/>
-    <pc:docChg chg="undo custSel modSld">
-      <pc:chgData name="Mikołaj Brukiewicz" userId="0886648156fb1e55" providerId="LiveId" clId="{86134D3F-58A3-43B9-AA87-820A6F778E19}" dt="2019-11-21T12:48:40.978" v="3027" actId="207"/>
-      <pc:docMkLst>
-        <pc:docMk/>
-      </pc:docMkLst>
-      <pc:sldChg chg="modSp">
-        <pc:chgData name="Mikołaj Brukiewicz" userId="0886648156fb1e55" providerId="LiveId" clId="{86134D3F-58A3-43B9-AA87-820A6F778E19}" dt="2019-11-21T11:24:02.690" v="58" actId="20577"/>
+      <pc:sldChg chg="addSp delSp modSp addCm delCm modCm">
+        <pc:chgData name="Bartosz Rodziewicz" userId="d82e455771f5ad08" providerId="LiveId" clId="{F5D64456-235D-4AE8-A862-E77A6539DEA5}" dt="2019-12-05T10:22:52.469" v="3855" actId="6549"/>
         <pc:sldMkLst>
           <pc:docMk/>
-          <pc:sldMk cId="0" sldId="256"/>
+          <pc:sldMk cId="2302810965" sldId="464"/>
         </pc:sldMkLst>
         <pc:spChg chg="mod">
-          <ac:chgData name="Mikołaj Brukiewicz" userId="0886648156fb1e55" providerId="LiveId" clId="{86134D3F-58A3-43B9-AA87-820A6F778E19}" dt="2019-11-21T11:24:02.690" v="58" actId="20577"/>
+          <ac:chgData name="Bartosz Rodziewicz" userId="d82e455771f5ad08" providerId="LiveId" clId="{F5D64456-235D-4AE8-A862-E77A6539DEA5}" dt="2019-12-05T09:57:02.712" v="698" actId="790"/>
           <ac:spMkLst>
             <pc:docMk/>
-            <pc:sldMk cId="0" sldId="256"/>
+            <pc:sldMk cId="2302810965" sldId="464"/>
             <ac:spMk id="2" creationId="{00000000-0000-0000-0000-000000000000}"/>
           </ac:spMkLst>
         </pc:spChg>
+        <pc:spChg chg="mod">
+          <ac:chgData name="Bartosz Rodziewicz" userId="d82e455771f5ad08" providerId="LiveId" clId="{F5D64456-235D-4AE8-A862-E77A6539DEA5}" dt="2019-12-05T09:49:57.310" v="641" actId="790"/>
+          <ac:spMkLst>
+            <pc:docMk/>
+            <pc:sldMk cId="2302810965" sldId="464"/>
+            <ac:spMk id="20" creationId="{CF090BF8-75F7-4DB3-8B35-CAC94FE55F2D}"/>
+          </ac:spMkLst>
+        </pc:spChg>
+        <pc:spChg chg="add mod">
+          <ac:chgData name="Bartosz Rodziewicz" userId="d82e455771f5ad08" providerId="LiveId" clId="{F5D64456-235D-4AE8-A862-E77A6539DEA5}" dt="2019-12-05T10:06:59.314" v="1812" actId="313"/>
+          <ac:spMkLst>
+            <pc:docMk/>
+            <pc:sldMk cId="2302810965" sldId="464"/>
+            <ac:spMk id="21" creationId="{DC294212-146C-49E2-AF47-64EB7B2F69FC}"/>
+          </ac:spMkLst>
+        </pc:spChg>
+        <pc:spChg chg="add mod">
+          <ac:chgData name="Bartosz Rodziewicz" userId="d82e455771f5ad08" providerId="LiveId" clId="{F5D64456-235D-4AE8-A862-E77A6539DEA5}" dt="2019-12-05T10:13:36.208" v="2713" actId="313"/>
+          <ac:spMkLst>
+            <pc:docMk/>
+            <pc:sldMk cId="2302810965" sldId="464"/>
+            <ac:spMk id="22" creationId="{959343F7-6F04-40AD-AE26-4D16FD31DC75}"/>
+          </ac:spMkLst>
+        </pc:spChg>
+        <pc:spChg chg="add del mod">
+          <ac:chgData name="Bartosz Rodziewicz" userId="d82e455771f5ad08" providerId="LiveId" clId="{F5D64456-235D-4AE8-A862-E77A6539DEA5}" dt="2019-12-05T10:18:03.428" v="3265" actId="948"/>
+          <ac:spMkLst>
+            <pc:docMk/>
+            <pc:sldMk cId="2302810965" sldId="464"/>
+            <ac:spMk id="23" creationId="{F5B20603-7E7D-46E6-8936-7B04CAAF211E}"/>
+          </ac:spMkLst>
+        </pc:spChg>
+        <pc:spChg chg="add mod">
+          <ac:chgData name="Bartosz Rodziewicz" userId="d82e455771f5ad08" providerId="LiveId" clId="{F5D64456-235D-4AE8-A862-E77A6539DEA5}" dt="2019-12-05T10:22:52.469" v="3855" actId="6549"/>
+          <ac:spMkLst>
+            <pc:docMk/>
+            <pc:sldMk cId="2302810965" sldId="464"/>
+            <ac:spMk id="26" creationId="{1DEBA789-1465-4DB9-A04E-E27AFDA3C60E}"/>
+          </ac:spMkLst>
+        </pc:spChg>
+        <pc:picChg chg="add mod">
+          <ac:chgData name="Bartosz Rodziewicz" userId="d82e455771f5ad08" providerId="LiveId" clId="{F5D64456-235D-4AE8-A862-E77A6539DEA5}" dt="2019-12-05T09:51:32.017" v="654" actId="1076"/>
+          <ac:picMkLst>
+            <pc:docMk/>
+            <pc:sldMk cId="2302810965" sldId="464"/>
+            <ac:picMk id="1026" creationId="{36A251EC-D8F5-4148-8B19-02439F64DD31}"/>
+          </ac:picMkLst>
+        </pc:picChg>
+        <pc:picChg chg="add mod">
+          <ac:chgData name="Bartosz Rodziewicz" userId="d82e455771f5ad08" providerId="LiveId" clId="{F5D64456-235D-4AE8-A862-E77A6539DEA5}" dt="2019-12-05T09:53:27.229" v="668" actId="1076"/>
+          <ac:picMkLst>
+            <pc:docMk/>
+            <pc:sldMk cId="2302810965" sldId="464"/>
+            <ac:picMk id="1028" creationId="{7DB47AB9-00FC-41CD-8C56-B528D9E2839E}"/>
+          </ac:picMkLst>
+        </pc:picChg>
+        <pc:picChg chg="add mod">
+          <ac:chgData name="Bartosz Rodziewicz" userId="d82e455771f5ad08" providerId="LiveId" clId="{F5D64456-235D-4AE8-A862-E77A6539DEA5}" dt="2019-12-05T09:54:14.959" v="672" actId="1076"/>
+          <ac:picMkLst>
+            <pc:docMk/>
+            <pc:sldMk cId="2302810965" sldId="464"/>
+            <ac:picMk id="1030" creationId="{CFDDE40B-76F3-40AF-8090-35BDB224C891}"/>
+          </ac:picMkLst>
+        </pc:picChg>
+        <pc:picChg chg="add mod">
+          <ac:chgData name="Bartosz Rodziewicz" userId="d82e455771f5ad08" providerId="LiveId" clId="{F5D64456-235D-4AE8-A862-E77A6539DEA5}" dt="2019-12-05T09:56:14.158" v="693" actId="962"/>
+          <ac:picMkLst>
+            <pc:docMk/>
+            <pc:sldMk cId="2302810965" sldId="464"/>
+            <ac:picMk id="1032" creationId="{31C343D6-9FD2-43EE-B32F-84EC095BC420}"/>
+          </ac:picMkLst>
+        </pc:picChg>
+        <pc:picChg chg="add del">
+          <ac:chgData name="Bartosz Rodziewicz" userId="d82e455771f5ad08" providerId="LiveId" clId="{F5D64456-235D-4AE8-A862-E77A6539DEA5}" dt="2019-12-05T10:17:33.844" v="3259"/>
+          <ac:picMkLst>
+            <pc:docMk/>
+            <pc:sldMk cId="2302810965" sldId="464"/>
+            <ac:picMk id="1034" creationId="{4F5BB85F-1543-4E57-8B2F-A53732EA32F8}"/>
+          </ac:picMkLst>
+        </pc:picChg>
       </pc:sldChg>
       <pc:sldChg chg="modSp">
-        <pc:chgData name="Mikołaj Brukiewicz" userId="0886648156fb1e55" providerId="LiveId" clId="{86134D3F-58A3-43B9-AA87-820A6F778E19}" dt="2019-11-21T11:49:22.506" v="1305" actId="5793"/>
+        <pc:chgData name="Bartosz Rodziewicz" userId="d82e455771f5ad08" providerId="LiveId" clId="{F5D64456-235D-4AE8-A862-E77A6539DEA5}" dt="2019-12-05T10:56:34.192" v="5309" actId="790"/>
         <pc:sldMkLst>
           <pc:docMk/>
-          <pc:sldMk cId="2362418509" sldId="422"/>
-        </pc:sldMkLst>
-        <pc:graphicFrameChg chg="modGraphic">
-          <ac:chgData name="Mikołaj Brukiewicz" userId="0886648156fb1e55" providerId="LiveId" clId="{86134D3F-58A3-43B9-AA87-820A6F778E19}" dt="2019-11-21T11:49:22.506" v="1305" actId="5793"/>
-          <ac:graphicFrameMkLst>
-            <pc:docMk/>
-            <pc:sldMk cId="2362418509" sldId="422"/>
-            <ac:graphicFrameMk id="8" creationId="{120EA9A7-2253-49C6-9DFF-1E67F36D4AD9}"/>
-          </ac:graphicFrameMkLst>
-        </pc:graphicFrameChg>
-      </pc:sldChg>
-      <pc:sldChg chg="modSp">
-        <pc:chgData name="Mikołaj Brukiewicz" userId="0886648156fb1e55" providerId="LiveId" clId="{86134D3F-58A3-43B9-AA87-820A6F778E19}" dt="2019-11-21T11:26:50.952" v="99" actId="20577"/>
-        <pc:sldMkLst>
-          <pc:docMk/>
-          <pc:sldMk cId="3608818552" sldId="444"/>
+          <pc:sldMk cId="2661227332" sldId="475"/>
         </pc:sldMkLst>
         <pc:spChg chg="mod">
-          <ac:chgData name="Mikołaj Brukiewicz" userId="0886648156fb1e55" providerId="LiveId" clId="{86134D3F-58A3-43B9-AA87-820A6F778E19}" dt="2019-11-21T11:26:50.952" v="99" actId="20577"/>
+          <ac:chgData name="Bartosz Rodziewicz" userId="d82e455771f5ad08" providerId="LiveId" clId="{F5D64456-235D-4AE8-A862-E77A6539DEA5}" dt="2019-12-05T10:56:34.192" v="5309" actId="790"/>
           <ac:spMkLst>
             <pc:docMk/>
-            <pc:sldMk cId="3608818552" sldId="444"/>
+            <pc:sldMk cId="2661227332" sldId="475"/>
+            <ac:spMk id="2" creationId="{00000000-0000-0000-0000-000000000000}"/>
+          </ac:spMkLst>
+        </pc:spChg>
+        <pc:spChg chg="mod">
+          <ac:chgData name="Bartosz Rodziewicz" userId="d82e455771f5ad08" providerId="LiveId" clId="{F5D64456-235D-4AE8-A862-E77A6539DEA5}" dt="2019-12-05T10:54:41.767" v="5284" actId="20577"/>
+          <ac:spMkLst>
+            <pc:docMk/>
+            <pc:sldMk cId="2661227332" sldId="475"/>
             <ac:spMk id="3" creationId="{00000000-0000-0000-0000-000000000000}"/>
           </ac:spMkLst>
         </pc:spChg>
       </pc:sldChg>
       <pc:sldChg chg="modSp">
-        <pc:chgData name="Mikołaj Brukiewicz" userId="0886648156fb1e55" providerId="LiveId" clId="{86134D3F-58A3-43B9-AA87-820A6F778E19}" dt="2019-11-21T11:23:05.498" v="24" actId="20577"/>
+        <pc:chgData name="Bartosz Rodziewicz" userId="d82e455771f5ad08" providerId="LiveId" clId="{F5D64456-235D-4AE8-A862-E77A6539DEA5}" dt="2019-12-05T10:56:30.615" v="5308" actId="790"/>
         <pc:sldMkLst>
           <pc:docMk/>
-          <pc:sldMk cId="2594758044" sldId="451"/>
+          <pc:sldMk cId="3058172167" sldId="482"/>
         </pc:sldMkLst>
         <pc:spChg chg="mod">
-          <ac:chgData name="Mikołaj Brukiewicz" userId="0886648156fb1e55" providerId="LiveId" clId="{86134D3F-58A3-43B9-AA87-820A6F778E19}" dt="2019-11-21T11:23:05.498" v="24" actId="20577"/>
+          <ac:chgData name="Bartosz Rodziewicz" userId="d82e455771f5ad08" providerId="LiveId" clId="{F5D64456-235D-4AE8-A862-E77A6539DEA5}" dt="2019-12-05T10:56:30.615" v="5308" actId="790"/>
           <ac:spMkLst>
             <pc:docMk/>
-            <pc:sldMk cId="2594758044" sldId="451"/>
+            <pc:sldMk cId="3058172167" sldId="482"/>
+            <ac:spMk id="2" creationId="{00000000-0000-0000-0000-000000000000}"/>
+          </ac:spMkLst>
+        </pc:spChg>
+        <pc:spChg chg="mod">
+          <ac:chgData name="Bartosz Rodziewicz" userId="d82e455771f5ad08" providerId="LiveId" clId="{F5D64456-235D-4AE8-A862-E77A6539DEA5}" dt="2019-12-05T10:54:58.484" v="5289" actId="20577"/>
+          <ac:spMkLst>
+            <pc:docMk/>
+            <pc:sldMk cId="3058172167" sldId="482"/>
             <ac:spMk id="3" creationId="{00000000-0000-0000-0000-000000000000}"/>
           </ac:spMkLst>
         </pc:spChg>
       </pc:sldChg>
       <pc:sldChg chg="modSp">
-        <pc:chgData name="Mikołaj Brukiewicz" userId="0886648156fb1e55" providerId="LiveId" clId="{86134D3F-58A3-43B9-AA87-820A6F778E19}" dt="2019-11-21T12:04:56.625" v="1823" actId="20577"/>
+        <pc:chgData name="Bartosz Rodziewicz" userId="d82e455771f5ad08" providerId="LiveId" clId="{F5D64456-235D-4AE8-A862-E77A6539DEA5}" dt="2019-12-05T10:56:27.060" v="5307" actId="790"/>
         <pc:sldMkLst>
           <pc:docMk/>
-          <pc:sldMk cId="4262534782" sldId="453"/>
+          <pc:sldMk cId="3261026117" sldId="483"/>
         </pc:sldMkLst>
         <pc:spChg chg="mod">
-          <ac:chgData name="Mikołaj Brukiewicz" userId="0886648156fb1e55" providerId="LiveId" clId="{86134D3F-58A3-43B9-AA87-820A6F778E19}" dt="2019-11-21T12:04:56.625" v="1823" actId="20577"/>
+          <ac:chgData name="Bartosz Rodziewicz" userId="d82e455771f5ad08" providerId="LiveId" clId="{F5D64456-235D-4AE8-A862-E77A6539DEA5}" dt="2019-12-05T10:56:27.060" v="5307" actId="790"/>
           <ac:spMkLst>
             <pc:docMk/>
-            <pc:sldMk cId="4262534782" sldId="453"/>
-            <ac:spMk id="3" creationId="{00000000-0000-0000-0000-000000000000}"/>
+            <pc:sldMk cId="3261026117" sldId="483"/>
+            <ac:spMk id="2" creationId="{00000000-0000-0000-0000-000000000000}"/>
           </ac:spMkLst>
         </pc:spChg>
-      </pc:sldChg>
-      <pc:sldChg chg="modSp">
-        <pc:chgData name="Mikołaj Brukiewicz" userId="0886648156fb1e55" providerId="LiveId" clId="{86134D3F-58A3-43B9-AA87-820A6F778E19}" dt="2019-11-21T11:37:13.088" v="720" actId="207"/>
-        <pc:sldMkLst>
-          <pc:docMk/>
-          <pc:sldMk cId="3114265317" sldId="455"/>
-        </pc:sldMkLst>
         <pc:spChg chg="mod">
-          <ac:chgData name="Mikołaj Brukiewicz" userId="0886648156fb1e55" providerId="LiveId" clId="{86134D3F-58A3-43B9-AA87-820A6F778E19}" dt="2019-11-21T11:37:13.088" v="720" actId="207"/>
+          <ac:chgData name="Bartosz Rodziewicz" userId="d82e455771f5ad08" providerId="LiveId" clId="{F5D64456-235D-4AE8-A862-E77A6539DEA5}" dt="2019-12-05T10:56:15.504" v="5306" actId="790"/>
           <ac:spMkLst>
             <pc:docMk/>
-            <pc:sldMk cId="3114265317" sldId="455"/>
-            <ac:spMk id="3" creationId="{00000000-0000-0000-0000-000000000000}"/>
-          </ac:spMkLst>
-        </pc:spChg>
-      </pc:sldChg>
-      <pc:sldChg chg="modSp">
-        <pc:chgData name="Mikołaj Brukiewicz" userId="0886648156fb1e55" providerId="LiveId" clId="{86134D3F-58A3-43B9-AA87-820A6F778E19}" dt="2019-11-21T11:45:23.062" v="1098" actId="20577"/>
-        <pc:sldMkLst>
-          <pc:docMk/>
-          <pc:sldMk cId="3708081354" sldId="457"/>
-        </pc:sldMkLst>
-        <pc:spChg chg="mod">
-          <ac:chgData name="Mikołaj Brukiewicz" userId="0886648156fb1e55" providerId="LiveId" clId="{86134D3F-58A3-43B9-AA87-820A6F778E19}" dt="2019-11-21T11:45:23.062" v="1098" actId="20577"/>
-          <ac:spMkLst>
-            <pc:docMk/>
-            <pc:sldMk cId="3708081354" sldId="457"/>
-            <ac:spMk id="3" creationId="{00000000-0000-0000-0000-000000000000}"/>
-          </ac:spMkLst>
-        </pc:spChg>
-      </pc:sldChg>
-      <pc:sldChg chg="modSp">
-        <pc:chgData name="Mikołaj Brukiewicz" userId="0886648156fb1e55" providerId="LiveId" clId="{86134D3F-58A3-43B9-AA87-820A6F778E19}" dt="2019-11-21T11:27:23.092" v="101" actId="20577"/>
-        <pc:sldMkLst>
-          <pc:docMk/>
-          <pc:sldMk cId="1643076518" sldId="459"/>
-        </pc:sldMkLst>
-        <pc:spChg chg="mod">
-          <ac:chgData name="Mikołaj Brukiewicz" userId="0886648156fb1e55" providerId="LiveId" clId="{86134D3F-58A3-43B9-AA87-820A6F778E19}" dt="2019-11-21T11:27:23.092" v="101" actId="20577"/>
-          <ac:spMkLst>
-            <pc:docMk/>
-            <pc:sldMk cId="1643076518" sldId="459"/>
-            <ac:spMk id="3" creationId="{00000000-0000-0000-0000-000000000000}"/>
-          </ac:spMkLst>
-        </pc:spChg>
-      </pc:sldChg>
-      <pc:sldChg chg="modSp">
-        <pc:chgData name="Mikołaj Brukiewicz" userId="0886648156fb1e55" providerId="LiveId" clId="{86134D3F-58A3-43B9-AA87-820A6F778E19}" dt="2019-11-21T11:50:03.068" v="1392" actId="207"/>
-        <pc:sldMkLst>
-          <pc:docMk/>
-          <pc:sldMk cId="3521595124" sldId="462"/>
-        </pc:sldMkLst>
-        <pc:spChg chg="mod">
-          <ac:chgData name="Mikołaj Brukiewicz" userId="0886648156fb1e55" providerId="LiveId" clId="{86134D3F-58A3-43B9-AA87-820A6F778E19}" dt="2019-11-21T11:50:03.068" v="1392" actId="207"/>
-          <ac:spMkLst>
-            <pc:docMk/>
-            <pc:sldMk cId="3521595124" sldId="462"/>
-            <ac:spMk id="3" creationId="{00000000-0000-0000-0000-000000000000}"/>
-          </ac:spMkLst>
-        </pc:spChg>
-      </pc:sldChg>
-      <pc:sldChg chg="modSp">
-        <pc:chgData name="Mikołaj Brukiewicz" userId="0886648156fb1e55" providerId="LiveId" clId="{86134D3F-58A3-43B9-AA87-820A6F778E19}" dt="2019-11-21T12:26:36.941" v="2334" actId="20577"/>
-        <pc:sldMkLst>
-          <pc:docMk/>
-          <pc:sldMk cId="3201811108" sldId="465"/>
-        </pc:sldMkLst>
-        <pc:spChg chg="mod">
-          <ac:chgData name="Mikołaj Brukiewicz" userId="0886648156fb1e55" providerId="LiveId" clId="{86134D3F-58A3-43B9-AA87-820A6F778E19}" dt="2019-11-21T12:26:36.941" v="2334" actId="20577"/>
-          <ac:spMkLst>
-            <pc:docMk/>
-            <pc:sldMk cId="3201811108" sldId="465"/>
-            <ac:spMk id="3" creationId="{00000000-0000-0000-0000-000000000000}"/>
-          </ac:spMkLst>
-        </pc:spChg>
-      </pc:sldChg>
-      <pc:sldChg chg="modSp">
-        <pc:chgData name="Mikołaj Brukiewicz" userId="0886648156fb1e55" providerId="LiveId" clId="{86134D3F-58A3-43B9-AA87-820A6F778E19}" dt="2019-11-21T12:14:37.636" v="2090" actId="207"/>
-        <pc:sldMkLst>
-          <pc:docMk/>
-          <pc:sldMk cId="2725443881" sldId="467"/>
-        </pc:sldMkLst>
-        <pc:spChg chg="mod">
-          <ac:chgData name="Mikołaj Brukiewicz" userId="0886648156fb1e55" providerId="LiveId" clId="{86134D3F-58A3-43B9-AA87-820A6F778E19}" dt="2019-11-21T12:14:37.636" v="2090" actId="207"/>
-          <ac:spMkLst>
-            <pc:docMk/>
-            <pc:sldMk cId="2725443881" sldId="467"/>
-            <ac:spMk id="3" creationId="{00000000-0000-0000-0000-000000000000}"/>
-          </ac:spMkLst>
-        </pc:spChg>
-      </pc:sldChg>
-      <pc:sldChg chg="modSp">
-        <pc:chgData name="Mikołaj Brukiewicz" userId="0886648156fb1e55" providerId="LiveId" clId="{86134D3F-58A3-43B9-AA87-820A6F778E19}" dt="2019-11-21T12:31:54.182" v="2506" actId="207"/>
-        <pc:sldMkLst>
-          <pc:docMk/>
-          <pc:sldMk cId="135983384" sldId="468"/>
-        </pc:sldMkLst>
-        <pc:spChg chg="mod">
-          <ac:chgData name="Mikołaj Brukiewicz" userId="0886648156fb1e55" providerId="LiveId" clId="{86134D3F-58A3-43B9-AA87-820A6F778E19}" dt="2019-11-21T12:31:54.182" v="2506" actId="207"/>
-          <ac:spMkLst>
-            <pc:docMk/>
-            <pc:sldMk cId="135983384" sldId="468"/>
-            <ac:spMk id="3" creationId="{00000000-0000-0000-0000-000000000000}"/>
-          </ac:spMkLst>
-        </pc:spChg>
-      </pc:sldChg>
-      <pc:sldChg chg="modSp">
-        <pc:chgData name="Mikołaj Brukiewicz" userId="0886648156fb1e55" providerId="LiveId" clId="{86134D3F-58A3-43B9-AA87-820A6F778E19}" dt="2019-11-21T12:48:40.978" v="3027" actId="207"/>
-        <pc:sldMkLst>
-          <pc:docMk/>
-          <pc:sldMk cId="2327819680" sldId="469"/>
-        </pc:sldMkLst>
-        <pc:spChg chg="mod">
-          <ac:chgData name="Mikołaj Brukiewicz" userId="0886648156fb1e55" providerId="LiveId" clId="{86134D3F-58A3-43B9-AA87-820A6F778E19}" dt="2019-11-21T12:48:40.978" v="3027" actId="207"/>
-          <ac:spMkLst>
-            <pc:docMk/>
-            <pc:sldMk cId="2327819680" sldId="469"/>
-            <ac:spMk id="3" creationId="{00000000-0000-0000-0000-000000000000}"/>
-          </ac:spMkLst>
-        </pc:spChg>
-      </pc:sldChg>
-      <pc:sldChg chg="modSp">
-        <pc:chgData name="Mikołaj Brukiewicz" userId="0886648156fb1e55" providerId="LiveId" clId="{86134D3F-58A3-43B9-AA87-820A6F778E19}" dt="2019-11-21T11:54:47.845" v="1820" actId="20578"/>
-        <pc:sldMkLst>
-          <pc:docMk/>
-          <pc:sldMk cId="2482326161" sldId="471"/>
-        </pc:sldMkLst>
-        <pc:spChg chg="mod">
-          <ac:chgData name="Mikołaj Brukiewicz" userId="0886648156fb1e55" providerId="LiveId" clId="{86134D3F-58A3-43B9-AA87-820A6F778E19}" dt="2019-11-21T11:54:47.845" v="1820" actId="20578"/>
-          <ac:spMkLst>
-            <pc:docMk/>
-            <pc:sldMk cId="2482326161" sldId="471"/>
-            <ac:spMk id="3" creationId="{00000000-0000-0000-0000-000000000000}"/>
-          </ac:spMkLst>
-        </pc:spChg>
-      </pc:sldChg>
-      <pc:sldChg chg="modSp">
-        <pc:chgData name="Mikołaj Brukiewicz" userId="0886648156fb1e55" providerId="LiveId" clId="{86134D3F-58A3-43B9-AA87-820A6F778E19}" dt="2019-11-21T12:37:12.396" v="2700" actId="207"/>
-        <pc:sldMkLst>
-          <pc:docMk/>
-          <pc:sldMk cId="2661227332" sldId="475"/>
-        </pc:sldMkLst>
-        <pc:spChg chg="mod">
-          <ac:chgData name="Mikołaj Brukiewicz" userId="0886648156fb1e55" providerId="LiveId" clId="{86134D3F-58A3-43B9-AA87-820A6F778E19}" dt="2019-11-21T12:37:12.396" v="2700" actId="207"/>
-          <ac:spMkLst>
-            <pc:docMk/>
-            <pc:sldMk cId="2661227332" sldId="475"/>
+            <pc:sldMk cId="3261026117" sldId="483"/>
             <ac:spMk id="3" creationId="{00000000-0000-0000-0000-000000000000}"/>
           </ac:spMkLst>
         </pc:spChg>
@@ -857,29 +1042,39 @@
 
 <file path=ppt/comments/comment1.xml><?xml version="1.0" encoding="utf-8"?>
 <p:cmLst xmlns:a="http://schemas.openxmlformats.org/drawingml/2006/main" xmlns:r="http://schemas.openxmlformats.org/officeDocument/2006/relationships" xmlns:p="http://schemas.openxmlformats.org/presentationml/2006/main">
-  <p:cm authorId="1" dt="2019-11-21T03:30:13.838" idx="1">
-    <p:pos x="10" y="10"/>
-    <p:text>
-do uzupelnienia
-</p:text>
+  <p:cm authorId="1" dt="2019-12-05T10:56:29.395" idx="3">
+    <p:pos x="4790" y="1139"/>
+    <p:text>Credits</p:text>
     <p:extLst>
       <p:ext uri="{C676402C-5697-4E1C-873F-D02D1690AC5C}">
-        <p15:threadingInfo xmlns:p15="http://schemas.microsoft.com/office/powerpoint/2012/main" timeZoneBias="480"/>
+        <p15:threadingInfo xmlns:p15="http://schemas.microsoft.com/office/powerpoint/2012/main" timeZoneBias="-60"/>
       </p:ext>
     </p:extLst>
   </p:cm>
-</p:cmLst>
-</file>
-
-<file path=ppt/comments/comment2.xml><?xml version="1.0" encoding="utf-8"?>
-<p:cmLst xmlns:a="http://schemas.openxmlformats.org/drawingml/2006/main" xmlns:r="http://schemas.openxmlformats.org/officeDocument/2006/relationships" xmlns:p="http://schemas.openxmlformats.org/presentationml/2006/main">
-  <p:cm authorId="1" dt="2019-11-21T03:44:40.637" idx="2">
-    <p:pos x="10" y="10"/>
-    <p:text>wyznanie sayori
-</p:text>
+  <p:cm authorId="1" dt="2019-12-05T11:07:28.898" idx="4">
+    <p:pos x="1534" y="1155"/>
+    <p:text>Śmierć Sayori</p:text>
     <p:extLst>
       <p:ext uri="{C676402C-5697-4E1C-873F-D02D1690AC5C}">
-        <p15:threadingInfo xmlns:p15="http://schemas.microsoft.com/office/powerpoint/2012/main" timeZoneBias="480"/>
+        <p15:threadingInfo xmlns:p15="http://schemas.microsoft.com/office/powerpoint/2012/main" timeZoneBias="-60"/>
+      </p:ext>
+    </p:extLst>
+  </p:cm>
+  <p:cm authorId="1" dt="2019-12-05T11:07:43.365" idx="5">
+    <p:pos x="2587" y="1141"/>
+    <p:text>Śmierć Yuri</p:text>
+    <p:extLst>
+      <p:ext uri="{C676402C-5697-4E1C-873F-D02D1690AC5C}">
+        <p15:threadingInfo xmlns:p15="http://schemas.microsoft.com/office/powerpoint/2012/main" timeZoneBias="-60"/>
+      </p:ext>
+    </p:extLst>
+  </p:cm>
+  <p:cm authorId="1" dt="2019-12-05T11:08:12.548" idx="7">
+    <p:pos x="3353" y="1216"/>
+    <p:text>Pokój Moniki</p:text>
+    <p:extLst>
+      <p:ext uri="{C676402C-5697-4E1C-873F-D02D1690AC5C}">
+        <p15:threadingInfo xmlns:p15="http://schemas.microsoft.com/office/powerpoint/2012/main" timeZoneBias="-60"/>
       </p:ext>
     </p:extLst>
   </p:cm>
@@ -968,7 +1163,7 @@
           <a:p>
             <a:fld id="{97F0C3B0-7BD4-48B8-BD7B-D2E8B6CC90DB}" type="datetimeFigureOut">
               <a:rPr lang="en-US" smtClean="0"/>
-              <a:t>11/21/2019</a:t>
+              <a:t>05.12.19</a:t>
             </a:fld>
             <a:endParaRPr lang="en-US"/>
           </a:p>
@@ -1510,7 +1705,7 @@
             <a:fld id="{60D39405-2DFC-48AC-83A7-710479D6B39A}" type="datetimeFigureOut">
               <a:rPr lang="en-US" smtClean="0"/>
               <a:pPr/>
-              <a:t>11/21/2019</a:t>
+              <a:t>05.12.19</a:t>
             </a:fld>
             <a:endParaRPr lang="en-US"/>
           </a:p>
@@ -1675,7 +1870,7 @@
             <a:fld id="{60D39405-2DFC-48AC-83A7-710479D6B39A}" type="datetimeFigureOut">
               <a:rPr lang="en-US" smtClean="0"/>
               <a:pPr/>
-              <a:t>11/21/2019</a:t>
+              <a:t>05.12.19</a:t>
             </a:fld>
             <a:endParaRPr lang="en-US"/>
           </a:p>
@@ -1850,7 +2045,7 @@
             <a:fld id="{60D39405-2DFC-48AC-83A7-710479D6B39A}" type="datetimeFigureOut">
               <a:rPr lang="en-US" smtClean="0"/>
               <a:pPr/>
-              <a:t>11/21/2019</a:t>
+              <a:t>05.12.19</a:t>
             </a:fld>
             <a:endParaRPr lang="en-US"/>
           </a:p>
@@ -2059,7 +2254,7 @@
             <a:fld id="{60D39405-2DFC-48AC-83A7-710479D6B39A}" type="datetimeFigureOut">
               <a:rPr lang="en-US" smtClean="0"/>
               <a:pPr/>
-              <a:t>11/21/2019</a:t>
+              <a:t>05.12.19</a:t>
             </a:fld>
             <a:endParaRPr lang="en-US"/>
           </a:p>
@@ -2301,7 +2496,7 @@
             <a:fld id="{60D39405-2DFC-48AC-83A7-710479D6B39A}" type="datetimeFigureOut">
               <a:rPr lang="en-US" smtClean="0"/>
               <a:pPr/>
-              <a:t>11/21/2019</a:t>
+              <a:t>05.12.19</a:t>
             </a:fld>
             <a:endParaRPr lang="en-US"/>
           </a:p>
@@ -2583,7 +2778,7 @@
             <a:fld id="{60D39405-2DFC-48AC-83A7-710479D6B39A}" type="datetimeFigureOut">
               <a:rPr lang="en-US" smtClean="0"/>
               <a:pPr/>
-              <a:t>11/21/2019</a:t>
+              <a:t>05.12.19</a:t>
             </a:fld>
             <a:endParaRPr lang="en-US"/>
           </a:p>
@@ -2999,7 +3194,7 @@
             <a:fld id="{60D39405-2DFC-48AC-83A7-710479D6B39A}" type="datetimeFigureOut">
               <a:rPr lang="en-US" smtClean="0"/>
               <a:pPr/>
-              <a:t>11/21/2019</a:t>
+              <a:t>05.12.19</a:t>
             </a:fld>
             <a:endParaRPr lang="en-US"/>
           </a:p>
@@ -3113,7 +3308,7 @@
             <a:fld id="{60D39405-2DFC-48AC-83A7-710479D6B39A}" type="datetimeFigureOut">
               <a:rPr lang="en-US" smtClean="0"/>
               <a:pPr/>
-              <a:t>11/21/2019</a:t>
+              <a:t>05.12.19</a:t>
             </a:fld>
             <a:endParaRPr lang="en-US"/>
           </a:p>
@@ -3205,7 +3400,7 @@
             <a:fld id="{60D39405-2DFC-48AC-83A7-710479D6B39A}" type="datetimeFigureOut">
               <a:rPr lang="en-US" smtClean="0"/>
               <a:pPr/>
-              <a:t>11/21/2019</a:t>
+              <a:t>05.12.19</a:t>
             </a:fld>
             <a:endParaRPr lang="en-US"/>
           </a:p>
@@ -3477,7 +3672,7 @@
             <a:fld id="{60D39405-2DFC-48AC-83A7-710479D6B39A}" type="datetimeFigureOut">
               <a:rPr lang="en-US" smtClean="0"/>
               <a:pPr/>
-              <a:t>11/21/2019</a:t>
+              <a:t>05.12.19</a:t>
             </a:fld>
             <a:endParaRPr lang="en-US"/>
           </a:p>
@@ -3726,7 +3921,7 @@
             <a:fld id="{60D39405-2DFC-48AC-83A7-710479D6B39A}" type="datetimeFigureOut">
               <a:rPr lang="en-US" smtClean="0"/>
               <a:pPr/>
-              <a:t>11/21/2019</a:t>
+              <a:t>05.12.19</a:t>
             </a:fld>
             <a:endParaRPr lang="en-US"/>
           </a:p>
@@ -3934,7 +4129,7 @@
             <a:fld id="{60D39405-2DFC-48AC-83A7-710479D6B39A}" type="datetimeFigureOut">
               <a:rPr lang="en-US" smtClean="0"/>
               <a:pPr/>
-              <a:t>11/21/2019</a:t>
+              <a:t>05.12.19</a:t>
             </a:fld>
             <a:endParaRPr lang="en-US"/>
           </a:p>
@@ -4328,70 +4523,82 @@
           <a:lstStyle/>
           <a:p>
             <a:r>
-              <a:rPr lang="pl-PL">
+              <a:rPr lang="pl-PL" dirty="0">
                 <a:latin typeface="Calibri Light" panose="020F0302020204030204" pitchFamily="34" charset="0"/>
               </a:rPr>
               <a:t>Formatka rozkładania gry</a:t>
             </a:r>
             <a:br>
-              <a:rPr lang="pl-PL">
+              <a:rPr lang="pl-PL" dirty="0">
                 <a:latin typeface="Calibri Light" panose="020F0302020204030204" pitchFamily="34" charset="0"/>
               </a:rPr>
             </a:br>
             <a:r>
-              <a:rPr lang="pl-PL">
+              <a:rPr lang="pl-PL" dirty="0">
                 <a:latin typeface="Calibri Light" panose="020F0302020204030204" pitchFamily="34" charset="0"/>
               </a:rPr>
-              <a:t>Doki Doki </a:t>
-            </a:r>
-            <a:r>
-              <a:rPr lang="pl-PL" err="1">
+              <a:t>Doki </a:t>
+            </a:r>
+            <a:r>
+              <a:rPr lang="pl-PL" dirty="0" err="1">
                 <a:latin typeface="Calibri Light" panose="020F0302020204030204" pitchFamily="34" charset="0"/>
               </a:rPr>
+              <a:t>Doki</a:t>
+            </a:r>
+            <a:r>
+              <a:rPr lang="pl-PL" dirty="0">
+                <a:latin typeface="Calibri Light" panose="020F0302020204030204" pitchFamily="34" charset="0"/>
+              </a:rPr>
+              <a:t> </a:t>
+            </a:r>
+            <a:r>
+              <a:rPr lang="pl-PL" dirty="0" err="1">
+                <a:latin typeface="Calibri Light" panose="020F0302020204030204" pitchFamily="34" charset="0"/>
+              </a:rPr>
               <a:t>Literature</a:t>
             </a:r>
             <a:r>
-              <a:rPr lang="pl-PL">
+              <a:rPr lang="pl-PL" dirty="0">
                 <a:latin typeface="Calibri Light" panose="020F0302020204030204" pitchFamily="34" charset="0"/>
               </a:rPr>
               <a:t> Club</a:t>
             </a:r>
             <a:br>
-              <a:rPr lang="pl-PL">
+              <a:rPr lang="pl-PL" dirty="0">
                 <a:latin typeface="Calibri Light" panose="020F0302020204030204" pitchFamily="34" charset="0"/>
               </a:rPr>
             </a:br>
             <a:r>
-              <a:rPr lang="pl-PL" sz="1800">
+              <a:rPr lang="pl-PL" sz="1800" dirty="0">
                 <a:latin typeface="Calibri Light" panose="020F0302020204030204" pitchFamily="34" charset="0"/>
               </a:rPr>
               <a:t>(</a:t>
             </a:r>
             <a:r>
-              <a:rPr lang="pl-PL" sz="1800" err="1">
+              <a:rPr lang="pl-PL" sz="1800" dirty="0" err="1">
                 <a:latin typeface="Calibri Light" panose="020F0302020204030204" pitchFamily="34" charset="0"/>
               </a:rPr>
               <a:t>spoilers</a:t>
             </a:r>
             <a:r>
-              <a:rPr lang="pl-PL" sz="1800">
+              <a:rPr lang="pl-PL" sz="1800" dirty="0">
                 <a:latin typeface="Calibri Light" panose="020F0302020204030204" pitchFamily="34" charset="0"/>
               </a:rPr>
               <a:t>, </a:t>
             </a:r>
             <a:r>
-              <a:rPr lang="pl-PL" sz="1800" err="1">
+              <a:rPr lang="pl-PL" sz="1800" dirty="0" err="1">
                 <a:latin typeface="Calibri Light" panose="020F0302020204030204" pitchFamily="34" charset="0"/>
               </a:rPr>
               <a:t>duh</a:t>
             </a:r>
             <a:r>
-              <a:rPr lang="pl-PL" sz="1800">
+              <a:rPr lang="pl-PL" sz="1800" dirty="0">
                 <a:latin typeface="Calibri Light" panose="020F0302020204030204" pitchFamily="34" charset="0"/>
               </a:rPr>
               <a:t>…)</a:t>
             </a:r>
-            <a:endParaRPr lang="en-US" sz="3600">
+            <a:endParaRPr lang="en-US" sz="3600" dirty="0">
               <a:latin typeface="Calibri Light" panose="020F0302020204030204" pitchFamily="34" charset="0"/>
             </a:endParaRPr>
           </a:p>
@@ -4415,23 +4622,35 @@
           <a:lstStyle/>
           <a:p>
             <a:r>
-              <a:rPr lang="pl-PL">
+              <a:rPr lang="pl-PL" dirty="0">
                 <a:latin typeface="Calibri Light" panose="020F0302020204030204" pitchFamily="34" charset="0"/>
               </a:rPr>
-              <a:t>Mikołaj Brukiewicz, 225954</a:t>
+              <a:t>Mikołaj </a:t>
+            </a:r>
+            <a:r>
+              <a:rPr lang="pl-PL" dirty="0" err="1">
+                <a:latin typeface="Calibri Light" panose="020F0302020204030204" pitchFamily="34" charset="0"/>
+              </a:rPr>
+              <a:t>Brukiewicz</a:t>
+            </a:r>
+            <a:r>
+              <a:rPr lang="pl-PL" dirty="0">
+                <a:latin typeface="Calibri Light" panose="020F0302020204030204" pitchFamily="34" charset="0"/>
+              </a:rPr>
+              <a:t>, 225954</a:t>
             </a:r>
             <a:br>
-              <a:rPr lang="pl-PL">
+              <a:rPr lang="pl-PL" dirty="0">
                 <a:latin typeface="Calibri Light" panose="020F0302020204030204" pitchFamily="34" charset="0"/>
               </a:rPr>
             </a:br>
             <a:r>
-              <a:rPr lang="pl-PL">
+              <a:rPr lang="pl-PL" dirty="0">
                 <a:latin typeface="Calibri Light" panose="020F0302020204030204" pitchFamily="34" charset="0"/>
               </a:rPr>
               <a:t>Bartosz Rodziewicz, 226105</a:t>
             </a:r>
-            <a:endParaRPr lang="en-US" i="1">
+            <a:endParaRPr lang="en-US" i="1" dirty="0">
               <a:latin typeface="Calibri Light" panose="020F0302020204030204" pitchFamily="34" charset="0"/>
             </a:endParaRPr>
           </a:p>
@@ -6217,7 +6436,7 @@
         </p:spPr>
         <p:txBody>
           <a:bodyPr>
-            <a:normAutofit/>
+            <a:normAutofit fontScale="55000" lnSpcReduction="20000"/>
           </a:bodyPr>
           <a:lstStyle/>
           <a:p>
@@ -6225,7 +6444,7 @@
               <a:buNone/>
             </a:pPr>
             <a:r>
-              <a:rPr lang="pl-PL" i="1">
+              <a:rPr lang="pl-PL" i="1" dirty="0">
                 <a:solidFill>
                   <a:schemeClr val="bg1">
                     <a:lumMod val="50000"/>
@@ -6240,7 +6459,54 @@
             <a:pPr marL="0" indent="0">
               <a:buNone/>
             </a:pPr>
-            <a:endParaRPr lang="pl-PL" i="1">
+            <a:r>
+              <a:rPr lang="pl-PL" dirty="0">
+                <a:latin typeface="Calibri Light" panose="020F0302020204030204" pitchFamily="34" charset="0"/>
+              </a:rPr>
+              <a:t>Pod koniec aktu I, gdy gracz zauważa coraz to większe problemy </a:t>
+            </a:r>
+            <a:r>
+              <a:rPr lang="pl-PL" dirty="0" err="1">
+                <a:latin typeface="Calibri Light" panose="020F0302020204030204" pitchFamily="34" charset="0"/>
+              </a:rPr>
+              <a:t>Sayori</a:t>
+            </a:r>
+            <a:r>
+              <a:rPr lang="pl-PL" dirty="0">
+                <a:latin typeface="Calibri Light" panose="020F0302020204030204" pitchFamily="34" charset="0"/>
+              </a:rPr>
+              <a:t> następuje scena, gdy </a:t>
+            </a:r>
+            <a:r>
+              <a:rPr lang="pl-PL" dirty="0" err="1">
+                <a:latin typeface="Calibri Light" panose="020F0302020204030204" pitchFamily="34" charset="0"/>
+              </a:rPr>
+              <a:t>Sayori</a:t>
+            </a:r>
+            <a:r>
+              <a:rPr lang="pl-PL" dirty="0">
+                <a:latin typeface="Calibri Light" panose="020F0302020204030204" pitchFamily="34" charset="0"/>
+              </a:rPr>
+              <a:t> wychodzi do gracza i wyznaje mu miłość. Gracz ma do wyboru dwie opcje – wyznać również swoją miłość, bądź stwierdzić, że kocha ją jak najlepszego przyjaciela. Niezależnie jednak od wyboru gracza gra prowadzi do nie uniknionego. Sytuację pogarsza fakt, że chwilę wcześniej </a:t>
+            </a:r>
+            <a:r>
+              <a:rPr lang="pl-PL" dirty="0" err="1">
+                <a:latin typeface="Calibri Light" panose="020F0302020204030204" pitchFamily="34" charset="0"/>
+              </a:rPr>
+              <a:t>Sayori</a:t>
+            </a:r>
+            <a:r>
+              <a:rPr lang="pl-PL" dirty="0">
+                <a:latin typeface="Calibri Light" panose="020F0302020204030204" pitchFamily="34" charset="0"/>
+              </a:rPr>
+              <a:t> widziała jak z domu gracza wychodzi jedna z dwóch dziewczyn z klubu (gracz miał wcześniej wybór tylko pomiędzy nimi). Założeniem fragment było wywołanie w graczu poczucia winy, gdy zobaczy koniec etapu oraz chęć ponownej gry by inaczej ułożyć historię.</a:t>
+            </a:r>
+          </a:p>
+          <a:p>
+            <a:pPr marL="0" indent="0">
+              <a:buNone/>
+            </a:pPr>
+            <a:endParaRPr lang="pl-PL" i="1" dirty="0">
               <a:solidFill>
                 <a:schemeClr val="bg1">
                   <a:lumMod val="50000"/>
@@ -6254,7 +6520,7 @@
               <a:buNone/>
             </a:pPr>
             <a:r>
-              <a:rPr lang="pl-PL" i="1">
+              <a:rPr lang="pl-PL" i="1" dirty="0">
                 <a:solidFill>
                   <a:schemeClr val="bg1">
                     <a:lumMod val="50000"/>
@@ -6262,10 +6528,10 @@
                 </a:solidFill>
                 <a:latin typeface="Calibri Light" panose="020F0302020204030204" pitchFamily="34" charset="0"/>
               </a:rPr>
-              <a:t>W jaki sposób nawiązuje on do Wizji Gry i założeń Player </a:t>
-            </a:r>
-            <a:r>
-              <a:rPr lang="pl-PL" i="1" err="1">
+              <a:t>W jaki sposób nawiązuje on do Wizji Gry i założeń </a:t>
+            </a:r>
+            <a:r>
+              <a:rPr lang="en-US" i="1" dirty="0">
                 <a:solidFill>
                   <a:schemeClr val="bg1">
                     <a:lumMod val="50000"/>
@@ -6273,10 +6539,10 @@
                 </a:solidFill>
                 <a:latin typeface="Calibri Light" panose="020F0302020204030204" pitchFamily="34" charset="0"/>
               </a:rPr>
-              <a:t>Experience</a:t>
-            </a:r>
-            <a:r>
-              <a:rPr lang="pl-PL" i="1">
+              <a:t>Player Experience</a:t>
+            </a:r>
+            <a:r>
+              <a:rPr lang="pl-PL" i="1" dirty="0">
                 <a:solidFill>
                   <a:schemeClr val="bg1">
                     <a:lumMod val="50000"/>
@@ -6285,6 +6551,49 @@
                 <a:latin typeface="Calibri Light" panose="020F0302020204030204" pitchFamily="34" charset="0"/>
               </a:rPr>
               <a:t>?</a:t>
+            </a:r>
+            <a:endParaRPr lang="en-US" i="1" dirty="0">
+              <a:solidFill>
+                <a:schemeClr val="bg1">
+                  <a:lumMod val="50000"/>
+                </a:schemeClr>
+              </a:solidFill>
+              <a:latin typeface="Calibri Light" panose="020F0302020204030204" pitchFamily="34" charset="0"/>
+            </a:endParaRPr>
+          </a:p>
+          <a:p>
+            <a:pPr marL="0" indent="0">
+              <a:buNone/>
+            </a:pPr>
+            <a:r>
+              <a:rPr lang="pl-PL" dirty="0">
+                <a:latin typeface="Calibri Light" panose="020F0302020204030204" pitchFamily="34" charset="0"/>
+              </a:rPr>
+              <a:t>W obu wypadkach wzbudzane jest w graczu poczucie winy. W przypadku, gdy gracz wybrał ścieżkę innej dziewczyny gracz czuje się winny za śmierć </a:t>
+            </a:r>
+            <a:r>
+              <a:rPr lang="pl-PL" dirty="0" err="1">
+                <a:latin typeface="Calibri Light" panose="020F0302020204030204" pitchFamily="34" charset="0"/>
+              </a:rPr>
+              <a:t>Sayori</a:t>
+            </a:r>
+            <a:r>
+              <a:rPr lang="pl-PL" dirty="0">
+                <a:latin typeface="Calibri Light" panose="020F0302020204030204" pitchFamily="34" charset="0"/>
+              </a:rPr>
+              <a:t> z powodu porzucenia swojej najlepszej przyjaciółki, a na końcu odrzucenia jej wyznania. Gdy jednak gracz akceptuję jej wyznanie czuje się winny, ponieważ historia mówi potem, że </a:t>
+            </a:r>
+            <a:r>
+              <a:rPr lang="pl-PL" dirty="0" err="1">
+                <a:latin typeface="Calibri Light" panose="020F0302020204030204" pitchFamily="34" charset="0"/>
+              </a:rPr>
+              <a:t>Sayori</a:t>
+            </a:r>
+            <a:r>
+              <a:rPr lang="pl-PL" dirty="0">
+                <a:latin typeface="Calibri Light" panose="020F0302020204030204" pitchFamily="34" charset="0"/>
+              </a:rPr>
+              <a:t> nie była gotowa psychicznie na to wyznanie i że lepiej było pozostać przyjaciółmi. Niezależnie jednak od tego jakiego wyboru dokona gracz, gra zawsze sprowadza się do jednego.</a:t>
             </a:r>
           </a:p>
         </p:txBody>
@@ -10931,7 +11240,7 @@
           <a:lstStyle/>
           <a:p>
             <a:r>
-              <a:rPr lang="pl-PL">
+              <a:rPr lang="pl-PL" dirty="0">
                 <a:solidFill>
                   <a:schemeClr val="tx1">
                     <a:lumMod val="95000"/>
@@ -10943,7 +11252,7 @@
               <a:t>Przykład </a:t>
             </a:r>
             <a:r>
-              <a:rPr lang="pl-PL" err="1">
+              <a:rPr lang="en-US" dirty="0">
                 <a:solidFill>
                   <a:schemeClr val="tx1">
                     <a:lumMod val="95000"/>
@@ -10954,15 +11263,6 @@
               </a:rPr>
               <a:t>workflow</a:t>
             </a:r>
-            <a:endParaRPr lang="en-US">
-              <a:solidFill>
-                <a:schemeClr val="tx1">
-                  <a:lumMod val="95000"/>
-                  <a:lumOff val="5000"/>
-                </a:schemeClr>
-              </a:solidFill>
-              <a:latin typeface="Calibri Light" panose="020F0302020204030204" pitchFamily="34" charset="0"/>
-            </a:endParaRPr>
           </a:p>
         </p:txBody>
       </p:sp>
@@ -10992,7 +11292,7 @@
               <a:buNone/>
             </a:pPr>
             <a:r>
-              <a:rPr lang="pl-PL" i="1">
+              <a:rPr lang="pl-PL" i="1" dirty="0">
                 <a:solidFill>
                   <a:schemeClr val="bg1">
                     <a:lumMod val="50000"/>
@@ -11009,25 +11309,19 @@
               <a:buChar char="-"/>
             </a:pPr>
             <a:r>
-              <a:rPr lang="pl-PL" i="1" err="1">
-                <a:latin typeface="Calibri Light"/>
-              </a:rPr>
-              <a:t>Requestor</a:t>
-            </a:r>
-            <a:r>
-              <a:rPr lang="pl-PL" i="1">
-                <a:latin typeface="Calibri Light"/>
-              </a:rPr>
-              <a:t>: Story designer (Dan </a:t>
-            </a:r>
-            <a:r>
-              <a:rPr lang="pl-PL" i="1" err="1">
+              <a:rPr lang="en-US" i="1" dirty="0">
+                <a:latin typeface="Calibri Light"/>
+              </a:rPr>
+              <a:t>Requestor: Story designer (Dan </a:t>
+            </a:r>
+            <a:r>
+              <a:rPr lang="en-US" i="1" dirty="0" err="1">
                 <a:latin typeface="Calibri Light"/>
               </a:rPr>
               <a:t>Salvato</a:t>
             </a:r>
             <a:r>
-              <a:rPr lang="pl-PL" i="1">
+              <a:rPr lang="en-US" i="1" dirty="0">
                 <a:latin typeface="Calibri Light"/>
               </a:rPr>
               <a:t>)</a:t>
@@ -11039,25 +11333,19 @@
               <a:buChar char="-"/>
             </a:pPr>
             <a:r>
-              <a:rPr lang="pl-PL" i="1" err="1">
-                <a:latin typeface="Calibri Light"/>
-              </a:rPr>
-              <a:t>Assignee</a:t>
-            </a:r>
-            <a:r>
-              <a:rPr lang="pl-PL" i="1">
-                <a:latin typeface="Calibri Light"/>
-              </a:rPr>
-              <a:t>: Content Designer (Dan </a:t>
-            </a:r>
-            <a:r>
-              <a:rPr lang="pl-PL" i="1" err="1">
+              <a:rPr lang="en-US" i="1" dirty="0">
+                <a:latin typeface="Calibri Light"/>
+              </a:rPr>
+              <a:t>Assignee: Content Designer (Dan </a:t>
+            </a:r>
+            <a:r>
+              <a:rPr lang="en-US" i="1" dirty="0" err="1">
                 <a:latin typeface="Calibri Light"/>
               </a:rPr>
               <a:t>Salvato</a:t>
             </a:r>
             <a:r>
-              <a:rPr lang="pl-PL" i="1">
+              <a:rPr lang="en-US" i="1" dirty="0">
                 <a:latin typeface="Calibri Light"/>
               </a:rPr>
               <a:t>)</a:t>
@@ -11069,28 +11357,10 @@
               <a:buChar char="-"/>
             </a:pPr>
             <a:r>
-              <a:rPr lang="pl-PL" i="1" err="1">
-                <a:latin typeface="Calibri Light"/>
-              </a:rPr>
-              <a:t>Task</a:t>
-            </a:r>
-            <a:r>
-              <a:rPr lang="pl-PL" i="1">
-                <a:latin typeface="Calibri Light"/>
-              </a:rPr>
-              <a:t> </a:t>
-            </a:r>
-            <a:r>
-              <a:rPr lang="pl-PL" i="1" err="1">
-                <a:latin typeface="Calibri Light"/>
-              </a:rPr>
-              <a:t>Title</a:t>
-            </a:r>
-            <a:r>
-              <a:rPr lang="pl-PL" i="1">
-                <a:latin typeface="Calibri Light"/>
-              </a:rPr>
-              <a:t>: „Monika CG design”</a:t>
+              <a:rPr lang="en-US" i="1" dirty="0">
+                <a:latin typeface="Calibri Light"/>
+              </a:rPr>
+              <a:t>Task Title: Monika CG design</a:t>
             </a:r>
           </a:p>
           <a:p>
@@ -11099,184 +11369,22 @@
               <a:buChar char="-"/>
             </a:pPr>
             <a:r>
-              <a:rPr lang="pl-PL" i="1" err="1">
-                <a:latin typeface="Calibri Light"/>
-              </a:rPr>
-              <a:t>Task</a:t>
-            </a:r>
-            <a:r>
-              <a:rPr lang="pl-PL" i="1">
-                <a:latin typeface="Calibri Light"/>
-              </a:rPr>
-              <a:t> </a:t>
-            </a:r>
-            <a:r>
-              <a:rPr lang="pl-PL" i="1" err="1">
-                <a:latin typeface="Calibri Light"/>
-              </a:rPr>
-              <a:t>Description</a:t>
-            </a:r>
-            <a:r>
-              <a:rPr lang="pl-PL" i="1">
-                <a:latin typeface="Calibri Light"/>
-              </a:rPr>
-              <a:t>: „</a:t>
-            </a:r>
-            <a:r>
-              <a:rPr lang="pl-PL" i="1" err="1">
-                <a:latin typeface="Calibri Light"/>
-              </a:rPr>
-              <a:t>Create</a:t>
-            </a:r>
-            <a:r>
-              <a:rPr lang="pl-PL" i="1">
-                <a:latin typeface="Calibri Light"/>
-              </a:rPr>
-              <a:t> </a:t>
-            </a:r>
-            <a:r>
-              <a:rPr lang="pl-PL" i="1" err="1">
-                <a:latin typeface="Calibri Light"/>
-              </a:rPr>
-              <a:t>new</a:t>
-            </a:r>
-            <a:r>
-              <a:rPr lang="pl-PL" i="1">
-                <a:latin typeface="Calibri Light"/>
-              </a:rPr>
-              <a:t> CG for Monika to </a:t>
-            </a:r>
-            <a:r>
-              <a:rPr lang="pl-PL" i="1" err="1">
-                <a:latin typeface="Calibri Light"/>
-              </a:rPr>
-              <a:t>use</a:t>
-            </a:r>
-            <a:r>
-              <a:rPr lang="pl-PL" i="1">
-                <a:latin typeface="Calibri Light"/>
-              </a:rPr>
-              <a:t> </a:t>
-            </a:r>
-            <a:r>
-              <a:rPr lang="pl-PL" i="1" err="1">
-                <a:latin typeface="Calibri Light"/>
-              </a:rPr>
-              <a:t>during</a:t>
-            </a:r>
-            <a:r>
-              <a:rPr lang="pl-PL" i="1">
-                <a:latin typeface="Calibri Light"/>
-              </a:rPr>
-              <a:t> </a:t>
-            </a:r>
-            <a:r>
-              <a:rPr lang="pl-PL" i="1" err="1">
-                <a:latin typeface="Calibri Light"/>
-              </a:rPr>
-              <a:t>final</a:t>
-            </a:r>
-            <a:r>
-              <a:rPr lang="pl-PL" i="1">
-                <a:latin typeface="Calibri Light"/>
-              </a:rPr>
-              <a:t> </a:t>
-            </a:r>
-            <a:r>
-              <a:rPr lang="pl-PL" i="1" err="1">
-                <a:latin typeface="Calibri Light"/>
-              </a:rPr>
-              <a:t>confrontation</a:t>
-            </a:r>
-            <a:r>
-              <a:rPr lang="pl-PL" i="1">
-                <a:latin typeface="Calibri Light"/>
-              </a:rPr>
-              <a:t> in the </a:t>
-            </a:r>
-            <a:r>
-              <a:rPr lang="pl-PL" i="1" err="1">
-                <a:latin typeface="Calibri Light"/>
-              </a:rPr>
-              <a:t>classroom</a:t>
-            </a:r>
-            <a:r>
-              <a:rPr lang="pl-PL" i="1">
-                <a:latin typeface="Calibri Light"/>
-              </a:rPr>
-              <a:t>. Dan </a:t>
-            </a:r>
-            <a:r>
-              <a:rPr lang="pl-PL" i="1" err="1">
+              <a:rPr lang="en-US" i="1" dirty="0">
+                <a:latin typeface="Calibri Light"/>
+              </a:rPr>
+              <a:t>Task Description: Create new CG for Monika to use during final confrontation in the classroom. Dan </a:t>
+            </a:r>
+            <a:r>
+              <a:rPr lang="en-US" i="1" dirty="0" err="1">
                 <a:latin typeface="Calibri Light"/>
               </a:rPr>
               <a:t>Salvato</a:t>
             </a:r>
             <a:r>
-              <a:rPr lang="pl-PL" i="1">
-                <a:latin typeface="Calibri Light"/>
-              </a:rPr>
-              <a:t> </a:t>
-            </a:r>
-            <a:r>
-              <a:rPr lang="pl-PL" i="1" err="1">
-                <a:latin typeface="Calibri Light"/>
-              </a:rPr>
-              <a:t>suggested</a:t>
-            </a:r>
-            <a:r>
-              <a:rPr lang="pl-PL" i="1">
-                <a:latin typeface="Calibri Light"/>
-              </a:rPr>
-              <a:t> to </a:t>
-            </a:r>
-            <a:r>
-              <a:rPr lang="pl-PL" i="1" err="1">
-                <a:latin typeface="Calibri Light"/>
-              </a:rPr>
-              <a:t>use</a:t>
-            </a:r>
-            <a:r>
-              <a:rPr lang="pl-PL" i="1">
-                <a:latin typeface="Calibri Light"/>
-              </a:rPr>
-              <a:t> the </a:t>
-            </a:r>
-            <a:r>
-              <a:rPr lang="pl-PL" i="1" err="1">
-                <a:latin typeface="Calibri Light"/>
-              </a:rPr>
-              <a:t>existing</a:t>
-            </a:r>
-            <a:r>
-              <a:rPr lang="pl-PL" i="1">
-                <a:latin typeface="Calibri Light"/>
-              </a:rPr>
-              <a:t> </a:t>
-            </a:r>
-            <a:r>
-              <a:rPr lang="pl-PL" i="1" err="1">
-                <a:latin typeface="Calibri Light"/>
-              </a:rPr>
-              <a:t>background</a:t>
-            </a:r>
-            <a:r>
-              <a:rPr lang="pl-PL" i="1">
-                <a:latin typeface="Calibri Light"/>
-              </a:rPr>
-              <a:t> </a:t>
-            </a:r>
-            <a:r>
-              <a:rPr lang="pl-PL" i="1" err="1">
-                <a:latin typeface="Calibri Light"/>
-              </a:rPr>
-              <a:t>created</a:t>
-            </a:r>
-            <a:r>
-              <a:rPr lang="pl-PL" i="1">
-                <a:latin typeface="Calibri Light"/>
-              </a:rPr>
-              <a:t> by Level designer.”</a:t>
+              <a:rPr lang="en-US" i="1" dirty="0">
+                <a:latin typeface="Calibri Light"/>
+              </a:rPr>
+              <a:t> suggested to use the existing background created by Level designer.</a:t>
             </a:r>
           </a:p>
         </p:txBody>
@@ -11353,7 +11461,7 @@
           <a:lstStyle/>
           <a:p>
             <a:r>
-              <a:rPr lang="pl-PL">
+              <a:rPr lang="pl-PL" dirty="0">
                 <a:solidFill>
                   <a:schemeClr val="tx1">
                     <a:lumMod val="95000"/>
@@ -11365,7 +11473,7 @@
               <a:t>Przykład </a:t>
             </a:r>
             <a:r>
-              <a:rPr lang="pl-PL" err="1">
+              <a:rPr lang="en-US" dirty="0">
                 <a:solidFill>
                   <a:schemeClr val="tx1">
                     <a:lumMod val="95000"/>
@@ -11376,15 +11484,6 @@
               </a:rPr>
               <a:t>workflow</a:t>
             </a:r>
-            <a:endParaRPr lang="en-US">
-              <a:solidFill>
-                <a:schemeClr val="tx1">
-                  <a:lumMod val="95000"/>
-                  <a:lumOff val="5000"/>
-                </a:schemeClr>
-              </a:solidFill>
-              <a:latin typeface="Calibri Light" panose="020F0302020204030204" pitchFamily="34" charset="0"/>
-            </a:endParaRPr>
           </a:p>
         </p:txBody>
       </p:sp>
@@ -11414,7 +11513,7 @@
               <a:buNone/>
             </a:pPr>
             <a:r>
-              <a:rPr lang="pl-PL" i="1">
+              <a:rPr lang="pl-PL" i="1" dirty="0">
                 <a:solidFill>
                   <a:schemeClr val="bg1">
                     <a:lumMod val="50000"/>
@@ -11431,25 +11530,19 @@
               <a:buChar char="-"/>
             </a:pPr>
             <a:r>
-              <a:rPr lang="pl-PL" i="1" err="1">
-                <a:latin typeface="Calibri Light"/>
-              </a:rPr>
-              <a:t>Requestor</a:t>
-            </a:r>
-            <a:r>
-              <a:rPr lang="pl-PL" i="1">
-                <a:latin typeface="Calibri Light"/>
-              </a:rPr>
-              <a:t>: Story designer (Dan </a:t>
-            </a:r>
-            <a:r>
-              <a:rPr lang="pl-PL" i="1" err="1">
+              <a:rPr lang="en-US" i="1" dirty="0">
+                <a:latin typeface="Calibri Light"/>
+              </a:rPr>
+              <a:t>Requestor: Story designer (Dan </a:t>
+            </a:r>
+            <a:r>
+              <a:rPr lang="en-US" i="1" dirty="0" err="1">
                 <a:latin typeface="Calibri Light"/>
               </a:rPr>
               <a:t>Salvato</a:t>
             </a:r>
             <a:r>
-              <a:rPr lang="pl-PL" i="1">
+              <a:rPr lang="en-US" i="1" dirty="0">
                 <a:latin typeface="Calibri Light"/>
               </a:rPr>
               <a:t>)</a:t>
@@ -11461,25 +11554,19 @@
               <a:buChar char="-"/>
             </a:pPr>
             <a:r>
-              <a:rPr lang="pl-PL" i="1" err="1">
-                <a:latin typeface="Calibri Light"/>
-              </a:rPr>
-              <a:t>Assignee</a:t>
-            </a:r>
-            <a:r>
-              <a:rPr lang="pl-PL" i="1">
-                <a:latin typeface="Calibri Light"/>
-              </a:rPr>
-              <a:t>: System Designer (Dan </a:t>
-            </a:r>
-            <a:r>
-              <a:rPr lang="pl-PL" i="1" err="1">
+              <a:rPr lang="en-US" i="1" dirty="0">
+                <a:latin typeface="Calibri Light"/>
+              </a:rPr>
+              <a:t>Assignee: System Designer (Dan </a:t>
+            </a:r>
+            <a:r>
+              <a:rPr lang="en-US" i="1" dirty="0" err="1">
                 <a:latin typeface="Calibri Light"/>
               </a:rPr>
               <a:t>Salvato</a:t>
             </a:r>
             <a:r>
-              <a:rPr lang="pl-PL" i="1">
+              <a:rPr lang="en-US" i="1" dirty="0">
                 <a:latin typeface="Calibri Light"/>
               </a:rPr>
               <a:t>)</a:t>
@@ -11491,682 +11578,82 @@
               <a:buChar char="-"/>
             </a:pPr>
             <a:r>
-              <a:rPr lang="pl-PL" i="1" err="1">
-                <a:latin typeface="Calibri Light"/>
-              </a:rPr>
-              <a:t>Task</a:t>
-            </a:r>
-            <a:r>
-              <a:rPr lang="pl-PL" i="1">
+              <a:rPr lang="en-US" i="1" dirty="0">
+                <a:latin typeface="Calibri Light"/>
+              </a:rPr>
+              <a:t>Task Title: Ability for player to write a poem</a:t>
+            </a:r>
+          </a:p>
+          <a:p>
+            <a:pPr>
+              <a:buFontTx/>
+              <a:buChar char="-"/>
+            </a:pPr>
+            <a:r>
+              <a:rPr lang="en-US" i="1" dirty="0">
+                <a:latin typeface="Calibri Light"/>
+              </a:rPr>
+              <a:t>Task Description: The main input from player will be taken by the poems. Create a view that lets a player “write” a poem or more exactly –</a:t>
+            </a:r>
+            <a:r>
+              <a:rPr lang="pl-PL" i="1" dirty="0">
                 <a:latin typeface="Calibri Light"/>
               </a:rPr>
               <a:t> </a:t>
             </a:r>
             <a:r>
-              <a:rPr lang="pl-PL" i="1" err="1">
-                <a:latin typeface="Calibri Light"/>
-              </a:rPr>
-              <a:t>Title</a:t>
-            </a:r>
-            <a:r>
-              <a:rPr lang="pl-PL" i="1">
-                <a:latin typeface="Calibri Light"/>
-              </a:rPr>
-              <a:t>: „</a:t>
-            </a:r>
-            <a:r>
-              <a:rPr lang="pl-PL" i="1" err="1">
-                <a:latin typeface="Calibri Light"/>
-              </a:rPr>
-              <a:t>Ability</a:t>
-            </a:r>
-            <a:r>
-              <a:rPr lang="pl-PL" i="1">
-                <a:latin typeface="Calibri Light"/>
-              </a:rPr>
-              <a:t> for </a:t>
-            </a:r>
-            <a:r>
-              <a:rPr lang="pl-PL" i="1" err="1">
-                <a:latin typeface="Calibri Light"/>
-              </a:rPr>
-              <a:t>player</a:t>
-            </a:r>
-            <a:r>
-              <a:rPr lang="pl-PL" i="1">
-                <a:latin typeface="Calibri Light"/>
-              </a:rPr>
-              <a:t> to </a:t>
-            </a:r>
-            <a:r>
-              <a:rPr lang="pl-PL" i="1" err="1">
-                <a:latin typeface="Calibri Light"/>
-              </a:rPr>
-              <a:t>write</a:t>
-            </a:r>
-            <a:r>
-              <a:rPr lang="pl-PL" i="1">
-                <a:latin typeface="Calibri Light"/>
-              </a:rPr>
-              <a:t> a </a:t>
-            </a:r>
-            <a:r>
-              <a:rPr lang="pl-PL" i="1" err="1">
-                <a:latin typeface="Calibri Light"/>
-              </a:rPr>
-              <a:t>poem</a:t>
-            </a:r>
-            <a:r>
-              <a:rPr lang="pl-PL" i="1">
-                <a:latin typeface="Calibri Light"/>
-              </a:rPr>
-              <a:t>”</a:t>
-            </a:r>
-          </a:p>
-          <a:p>
-            <a:pPr>
-              <a:buFont typeface="Arial"/>
-              <a:buChar char="•"/>
-            </a:pPr>
-            <a:r>
-              <a:rPr lang="pl-PL" i="1" err="1">
-                <a:latin typeface="Calibri Light"/>
-              </a:rPr>
-              <a:t>Task</a:t>
-            </a:r>
-            <a:r>
-              <a:rPr lang="pl-PL" i="1">
+              <a:rPr lang="en-US" i="1" dirty="0">
+                <a:latin typeface="Calibri Light"/>
+              </a:rPr>
+              <a:t>select</a:t>
+            </a:r>
+            <a:r>
+              <a:rPr lang="pl-PL" i="1" dirty="0">
                 <a:latin typeface="Calibri Light"/>
               </a:rPr>
               <a:t> </a:t>
             </a:r>
             <a:r>
-              <a:rPr lang="pl-PL" i="1" err="1">
-                <a:latin typeface="Calibri Light"/>
-              </a:rPr>
-              <a:t>Description</a:t>
-            </a:r>
-            <a:r>
-              <a:rPr lang="pl-PL" i="1">
-                <a:latin typeface="Calibri Light"/>
-              </a:rPr>
-              <a:t>: „The </a:t>
-            </a:r>
-            <a:r>
-              <a:rPr lang="pl-PL" i="1" err="1">
-                <a:latin typeface="Calibri Light"/>
-              </a:rPr>
-              <a:t>main</a:t>
-            </a:r>
-            <a:r>
-              <a:rPr lang="pl-PL" i="1">
+              <a:rPr lang="en-US" i="1" dirty="0">
+                <a:latin typeface="Calibri Light"/>
+              </a:rPr>
+              <a:t>20 words from a random list where every word will be liked or disliked </a:t>
+            </a:r>
+            <a:r>
+              <a:rPr lang="pl-PL" i="1" dirty="0">
+                <a:latin typeface="Calibri Light"/>
+              </a:rPr>
+              <a:t>by </a:t>
+            </a:r>
+            <a:r>
+              <a:rPr lang="en-US" i="1" dirty="0">
+                <a:latin typeface="Calibri Light"/>
+              </a:rPr>
+              <a:t>one</a:t>
+            </a:r>
+            <a:r>
+              <a:rPr lang="pl-PL" i="1" dirty="0">
                 <a:latin typeface="Calibri Light"/>
               </a:rPr>
               <a:t> </a:t>
             </a:r>
             <a:r>
-              <a:rPr lang="pl-PL" i="1" err="1">
-                <a:latin typeface="Calibri Light"/>
-              </a:rPr>
-              <a:t>input</a:t>
-            </a:r>
-            <a:r>
-              <a:rPr lang="pl-PL" i="1">
-                <a:latin typeface="Calibri Light"/>
-              </a:rPr>
-              <a:t> from </a:t>
-            </a:r>
-            <a:r>
-              <a:rPr lang="pl-PL" i="1" err="1">
-                <a:latin typeface="Calibri Light"/>
-              </a:rPr>
-              <a:t>player</a:t>
-            </a:r>
-            <a:r>
-              <a:rPr lang="pl-PL" i="1">
-                <a:latin typeface="Calibri Light"/>
-              </a:rPr>
-              <a:t> </a:t>
-            </a:r>
-            <a:r>
-              <a:rPr lang="pl-PL" i="1" err="1">
-                <a:latin typeface="Calibri Light"/>
-              </a:rPr>
-              <a:t>will</a:t>
-            </a:r>
-            <a:r>
-              <a:rPr lang="pl-PL" i="1">
-                <a:latin typeface="Calibri Light"/>
-              </a:rPr>
-              <a:t> be </a:t>
-            </a:r>
-            <a:r>
-              <a:rPr lang="pl-PL" i="1" err="1">
-                <a:latin typeface="Calibri Light"/>
-              </a:rPr>
-              <a:t>taken</a:t>
-            </a:r>
-            <a:r>
-              <a:rPr lang="pl-PL" i="1">
-                <a:latin typeface="Calibri Light"/>
-              </a:rPr>
-              <a:t> by the </a:t>
-            </a:r>
-            <a:r>
-              <a:rPr lang="pl-PL" i="1" err="1">
-                <a:latin typeface="Calibri Light"/>
-              </a:rPr>
-              <a:t>poems</a:t>
-            </a:r>
-            <a:r>
-              <a:rPr lang="pl-PL" i="1">
-                <a:latin typeface="Calibri Light"/>
-              </a:rPr>
-              <a:t>. </a:t>
-            </a:r>
-            <a:r>
-              <a:rPr lang="pl-PL" i="1" err="1">
-                <a:latin typeface="Calibri Light"/>
-              </a:rPr>
-              <a:t>Create</a:t>
-            </a:r>
-            <a:r>
-              <a:rPr lang="pl-PL" i="1">
-                <a:latin typeface="Calibri Light"/>
-              </a:rPr>
-              <a:t> a </a:t>
-            </a:r>
-            <a:r>
-              <a:rPr lang="pl-PL" i="1" err="1">
-                <a:latin typeface="Calibri Light"/>
-              </a:rPr>
-              <a:t>view</a:t>
-            </a:r>
-            <a:r>
-              <a:rPr lang="pl-PL" i="1">
-                <a:latin typeface="Calibri Light"/>
-              </a:rPr>
-              <a:t> </a:t>
-            </a:r>
-            <a:r>
-              <a:rPr lang="pl-PL" i="1" err="1">
-                <a:latin typeface="Calibri Light"/>
-              </a:rPr>
-              <a:t>that</a:t>
-            </a:r>
-            <a:r>
-              <a:rPr lang="pl-PL" i="1">
-                <a:latin typeface="Calibri Light"/>
-              </a:rPr>
-              <a:t> </a:t>
-            </a:r>
-            <a:r>
-              <a:rPr lang="pl-PL" i="1" err="1">
-                <a:latin typeface="Calibri Light"/>
-              </a:rPr>
-              <a:t>lets</a:t>
-            </a:r>
-            <a:r>
-              <a:rPr lang="pl-PL" i="1">
-                <a:latin typeface="Calibri Light"/>
-              </a:rPr>
-              <a:t> a </a:t>
-            </a:r>
-            <a:r>
-              <a:rPr lang="pl-PL" i="1" err="1">
-                <a:latin typeface="Calibri Light"/>
-              </a:rPr>
-              <a:t>player</a:t>
-            </a:r>
-            <a:r>
-              <a:rPr lang="pl-PL" i="1">
-                <a:latin typeface="Calibri Light"/>
-              </a:rPr>
-              <a:t> to "</a:t>
-            </a:r>
-            <a:r>
-              <a:rPr lang="pl-PL" i="1" err="1">
-                <a:latin typeface="Calibri Light"/>
-              </a:rPr>
-              <a:t>write</a:t>
-            </a:r>
-            <a:r>
-              <a:rPr lang="pl-PL" i="1">
-                <a:latin typeface="Calibri Light"/>
-              </a:rPr>
-              <a:t>" a </a:t>
-            </a:r>
-            <a:r>
-              <a:rPr lang="pl-PL" i="1" err="1">
-                <a:latin typeface="Calibri Light"/>
-              </a:rPr>
-              <a:t>poem</a:t>
-            </a:r>
-            <a:r>
-              <a:rPr lang="pl-PL" i="1">
-                <a:latin typeface="Calibri Light"/>
-              </a:rPr>
-              <a:t> </a:t>
-            </a:r>
-            <a:r>
-              <a:rPr lang="pl-PL" i="1" err="1">
-                <a:latin typeface="Calibri Light"/>
-              </a:rPr>
-              <a:t>or</a:t>
-            </a:r>
-            <a:r>
-              <a:rPr lang="pl-PL" i="1">
-                <a:latin typeface="Calibri Light"/>
-              </a:rPr>
-              <a:t> </a:t>
-            </a:r>
-            <a:r>
-              <a:rPr lang="pl-PL" i="1" err="1">
-                <a:latin typeface="Calibri Light"/>
-              </a:rPr>
-              <a:t>more</a:t>
-            </a:r>
-            <a:r>
-              <a:rPr lang="pl-PL" i="1">
-                <a:latin typeface="Calibri Light"/>
-              </a:rPr>
-              <a:t> </a:t>
-            </a:r>
-            <a:r>
-              <a:rPr lang="pl-PL" i="1" err="1">
-                <a:latin typeface="Calibri Light"/>
-              </a:rPr>
-              <a:t>exactly</a:t>
-            </a:r>
-            <a:r>
-              <a:rPr lang="pl-PL" i="1">
-                <a:latin typeface="Calibri Light"/>
-              </a:rPr>
-              <a:t> </a:t>
-            </a:r>
-            <a:r>
-              <a:rPr lang="pl-PL" i="1" err="1">
-                <a:latin typeface="Calibri Light"/>
-              </a:rPr>
-              <a:t>select</a:t>
-            </a:r>
-            <a:r>
-              <a:rPr lang="pl-PL" i="1">
-                <a:latin typeface="Calibri Light"/>
-              </a:rPr>
-              <a:t> 20 </a:t>
-            </a:r>
-            <a:r>
-              <a:rPr lang="pl-PL" i="1" err="1">
-                <a:latin typeface="Calibri Light"/>
-              </a:rPr>
-              <a:t>words</a:t>
-            </a:r>
-            <a:r>
-              <a:rPr lang="pl-PL" i="1">
-                <a:latin typeface="Calibri Light"/>
-              </a:rPr>
-              <a:t> from a </a:t>
-            </a:r>
-            <a:r>
-              <a:rPr lang="pl-PL" i="1" err="1">
-                <a:latin typeface="Calibri Light"/>
-              </a:rPr>
-              <a:t>random</a:t>
-            </a:r>
-            <a:r>
-              <a:rPr lang="pl-PL" i="1">
-                <a:latin typeface="Calibri Light"/>
-              </a:rPr>
-              <a:t> list </a:t>
-            </a:r>
-            <a:r>
-              <a:rPr lang="pl-PL" i="1" err="1">
-                <a:latin typeface="Calibri Light"/>
-              </a:rPr>
-              <a:t>where</a:t>
-            </a:r>
-            <a:r>
-              <a:rPr lang="pl-PL" i="1">
-                <a:latin typeface="Calibri Light"/>
-              </a:rPr>
-              <a:t> </a:t>
-            </a:r>
-            <a:r>
-              <a:rPr lang="pl-PL" i="1" err="1">
-                <a:latin typeface="Calibri Light"/>
-              </a:rPr>
-              <a:t>every</a:t>
-            </a:r>
-            <a:r>
-              <a:rPr lang="pl-PL" i="1">
-                <a:latin typeface="Calibri Light"/>
-              </a:rPr>
-              <a:t> </a:t>
-            </a:r>
-            <a:r>
-              <a:rPr lang="pl-PL" i="1" err="1">
-                <a:latin typeface="Calibri Light"/>
-              </a:rPr>
-              <a:t>word</a:t>
-            </a:r>
-            <a:r>
-              <a:rPr lang="pl-PL" i="1">
-                <a:latin typeface="Calibri Light"/>
-              </a:rPr>
-              <a:t> </a:t>
-            </a:r>
-            <a:r>
-              <a:rPr lang="pl-PL" i="1" err="1">
-                <a:latin typeface="Calibri Light"/>
-              </a:rPr>
-              <a:t>will</a:t>
-            </a:r>
-            <a:r>
-              <a:rPr lang="pl-PL" i="1">
-                <a:latin typeface="Calibri Light"/>
-              </a:rPr>
-              <a:t> be </a:t>
-            </a:r>
-            <a:r>
-              <a:rPr lang="pl-PL" i="1" err="1">
-                <a:latin typeface="Calibri Light"/>
-              </a:rPr>
-              <a:t>liked</a:t>
-            </a:r>
-            <a:r>
-              <a:rPr lang="pl-PL" i="1">
-                <a:latin typeface="Calibri Light"/>
-              </a:rPr>
-              <a:t> </a:t>
-            </a:r>
-            <a:r>
-              <a:rPr lang="pl-PL" i="1" err="1">
-                <a:latin typeface="Calibri Light"/>
-              </a:rPr>
-              <a:t>or</a:t>
-            </a:r>
-            <a:r>
-              <a:rPr lang="pl-PL" i="1">
-                <a:latin typeface="Calibri Light"/>
-              </a:rPr>
-              <a:t> </a:t>
-            </a:r>
-            <a:r>
-              <a:rPr lang="pl-PL" i="1" err="1">
-                <a:latin typeface="Calibri Light"/>
-              </a:rPr>
-              <a:t>disliked</a:t>
-            </a:r>
-            <a:r>
-              <a:rPr lang="pl-PL" i="1">
-                <a:latin typeface="Calibri Light"/>
-              </a:rPr>
-              <a:t> by aby of 3 </a:t>
-            </a:r>
-            <a:r>
-              <a:rPr lang="pl-PL" i="1" err="1">
-                <a:latin typeface="Calibri Light"/>
-              </a:rPr>
-              <a:t>characters</a:t>
-            </a:r>
-            <a:r>
-              <a:rPr lang="pl-PL" i="1">
-                <a:latin typeface="Calibri Light"/>
-              </a:rPr>
-              <a:t>. </a:t>
-            </a:r>
-            <a:r>
-              <a:rPr lang="pl-PL" i="1" err="1">
-                <a:latin typeface="Calibri Light"/>
-              </a:rPr>
-              <a:t>When</a:t>
-            </a:r>
-            <a:r>
-              <a:rPr lang="pl-PL" i="1">
-                <a:latin typeface="Calibri Light"/>
-              </a:rPr>
-              <a:t> </a:t>
-            </a:r>
-            <a:r>
-              <a:rPr lang="pl-PL" i="1" err="1">
-                <a:latin typeface="Calibri Light"/>
-              </a:rPr>
-              <a:t>player</a:t>
-            </a:r>
-            <a:r>
-              <a:rPr lang="pl-PL" i="1">
-                <a:latin typeface="Calibri Light"/>
-              </a:rPr>
-              <a:t> </a:t>
-            </a:r>
-            <a:r>
-              <a:rPr lang="pl-PL" i="1" err="1">
-                <a:latin typeface="Calibri Light"/>
-              </a:rPr>
-              <a:t>choose</a:t>
-            </a:r>
-            <a:r>
-              <a:rPr lang="pl-PL" i="1">
-                <a:latin typeface="Calibri Light"/>
-              </a:rPr>
-              <a:t> a </a:t>
-            </a:r>
-            <a:r>
-              <a:rPr lang="pl-PL" i="1" err="1">
-                <a:latin typeface="Calibri Light"/>
-              </a:rPr>
-              <a:t>word</a:t>
-            </a:r>
-            <a:r>
-              <a:rPr lang="pl-PL" i="1">
-                <a:latin typeface="Calibri Light"/>
-              </a:rPr>
-              <a:t> </a:t>
-            </a:r>
-            <a:r>
-              <a:rPr lang="pl-PL" i="1" err="1">
-                <a:latin typeface="Calibri Light"/>
-              </a:rPr>
-              <a:t>that</a:t>
-            </a:r>
-            <a:r>
-              <a:rPr lang="pl-PL" i="1">
-                <a:latin typeface="Calibri Light"/>
-              </a:rPr>
-              <a:t> a </a:t>
-            </a:r>
-            <a:r>
-              <a:rPr lang="pl-PL" i="1" err="1">
-                <a:latin typeface="Calibri Light"/>
-              </a:rPr>
-              <a:t>charater</a:t>
-            </a:r>
-            <a:r>
-              <a:rPr lang="pl-PL" i="1">
-                <a:latin typeface="Calibri Light"/>
-              </a:rPr>
-              <a:t> </a:t>
-            </a:r>
-            <a:r>
-              <a:rPr lang="pl-PL" i="1" err="1">
-                <a:latin typeface="Calibri Light"/>
-              </a:rPr>
-              <a:t>likes</a:t>
-            </a:r>
-            <a:r>
-              <a:rPr lang="pl-PL" i="1">
-                <a:latin typeface="Calibri Light"/>
-              </a:rPr>
-              <a:t> </a:t>
-            </a:r>
-            <a:r>
-              <a:rPr lang="pl-PL" i="1" err="1">
-                <a:latin typeface="Calibri Light"/>
-              </a:rPr>
-              <a:t>her</a:t>
-            </a:r>
-            <a:r>
-              <a:rPr lang="pl-PL" i="1">
-                <a:latin typeface="Calibri Light"/>
-              </a:rPr>
-              <a:t> </a:t>
-            </a:r>
-            <a:r>
-              <a:rPr lang="pl-PL" i="1" err="1">
-                <a:latin typeface="Calibri Light"/>
-              </a:rPr>
-              <a:t>sprite</a:t>
-            </a:r>
-            <a:r>
-              <a:rPr lang="pl-PL" i="1">
-                <a:latin typeface="Calibri Light"/>
-              </a:rPr>
-              <a:t> </a:t>
-            </a:r>
-            <a:r>
-              <a:rPr lang="pl-PL" i="1" err="1">
-                <a:latin typeface="Calibri Light"/>
-              </a:rPr>
-              <a:t>should</a:t>
-            </a:r>
-            <a:r>
-              <a:rPr lang="pl-PL" i="1">
-                <a:latin typeface="Calibri Light"/>
-              </a:rPr>
-              <a:t> be </a:t>
-            </a:r>
-            <a:r>
-              <a:rPr lang="pl-PL" i="1" err="1">
-                <a:latin typeface="Calibri Light"/>
-              </a:rPr>
-              <a:t>animated</a:t>
-            </a:r>
-            <a:r>
-              <a:rPr lang="pl-PL" i="1">
-                <a:latin typeface="Calibri Light"/>
-              </a:rPr>
-              <a:t>. </a:t>
-            </a:r>
-            <a:r>
-              <a:rPr lang="pl-PL" i="1" err="1">
-                <a:latin typeface="Calibri Light"/>
-              </a:rPr>
-              <a:t>Sprites</a:t>
-            </a:r>
-            <a:r>
-              <a:rPr lang="pl-PL" i="1">
-                <a:latin typeface="Calibri Light"/>
-              </a:rPr>
-              <a:t> </a:t>
-            </a:r>
-            <a:r>
-              <a:rPr lang="pl-PL" i="1" err="1">
-                <a:latin typeface="Calibri Light"/>
-              </a:rPr>
-              <a:t>will</a:t>
-            </a:r>
-            <a:r>
-              <a:rPr lang="pl-PL" i="1">
-                <a:latin typeface="Calibri Light"/>
-              </a:rPr>
-              <a:t> be </a:t>
-            </a:r>
-            <a:r>
-              <a:rPr lang="pl-PL" i="1" err="1">
-                <a:latin typeface="Calibri Light"/>
-              </a:rPr>
-              <a:t>provided</a:t>
-            </a:r>
-            <a:r>
-              <a:rPr lang="pl-PL" i="1">
-                <a:latin typeface="Calibri Light"/>
-              </a:rPr>
-              <a:t> by Content Designer, </a:t>
-            </a:r>
-            <a:r>
-              <a:rPr lang="pl-PL" i="1" err="1">
-                <a:latin typeface="Calibri Light"/>
-              </a:rPr>
-              <a:t>related</a:t>
-            </a:r>
-            <a:r>
-              <a:rPr lang="pl-PL" i="1">
-                <a:latin typeface="Calibri Light"/>
-              </a:rPr>
-              <a:t> JIRA </a:t>
-            </a:r>
-            <a:r>
-              <a:rPr lang="pl-PL" i="1" err="1">
-                <a:latin typeface="Calibri Light"/>
-              </a:rPr>
-              <a:t>task</a:t>
-            </a:r>
-            <a:r>
-              <a:rPr lang="pl-PL" i="1">
-                <a:latin typeface="Calibri Light"/>
-              </a:rPr>
-              <a:t> (DDLC-2137) </a:t>
-            </a:r>
-            <a:r>
-              <a:rPr lang="pl-PL" i="1" err="1">
-                <a:latin typeface="Calibri Light"/>
-              </a:rPr>
-              <a:t>is</a:t>
-            </a:r>
-            <a:r>
-              <a:rPr lang="pl-PL" i="1">
-                <a:latin typeface="Calibri Light"/>
-              </a:rPr>
-              <a:t> </a:t>
-            </a:r>
-            <a:r>
-              <a:rPr lang="pl-PL" i="1" err="1">
-                <a:latin typeface="Calibri Light"/>
-              </a:rPr>
-              <a:t>already</a:t>
-            </a:r>
-            <a:r>
-              <a:rPr lang="pl-PL" i="1">
-                <a:latin typeface="Calibri Light"/>
-              </a:rPr>
-              <a:t> </a:t>
-            </a:r>
-            <a:r>
-              <a:rPr lang="pl-PL" i="1" err="1">
-                <a:latin typeface="Calibri Light"/>
-              </a:rPr>
-              <a:t>opened</a:t>
-            </a:r>
-            <a:r>
-              <a:rPr lang="pl-PL" i="1">
-                <a:latin typeface="Calibri Light"/>
-              </a:rPr>
-              <a:t> and </a:t>
-            </a:r>
-            <a:r>
-              <a:rPr lang="pl-PL" i="1" err="1">
-                <a:latin typeface="Calibri Light"/>
-              </a:rPr>
-              <a:t>assigned</a:t>
-            </a:r>
-            <a:r>
-              <a:rPr lang="pl-PL" i="1">
-                <a:latin typeface="Calibri Light"/>
-              </a:rPr>
-              <a:t> for Dan </a:t>
-            </a:r>
-            <a:r>
-              <a:rPr lang="pl-PL" i="1" err="1">
+              <a:rPr lang="en-US" i="1" dirty="0">
+                <a:latin typeface="Calibri Light"/>
+              </a:rPr>
+              <a:t>of 3 characters. When player choose a word that a character likes her sprite should be animated. Sprites will be provided by Content Designer, related JIRA task (DDLC-2137) is already opened and assigned for Dan </a:t>
+            </a:r>
+            <a:r>
+              <a:rPr lang="en-US" i="1" dirty="0" err="1">
                 <a:latin typeface="Calibri Light"/>
               </a:rPr>
               <a:t>Salvato</a:t>
             </a:r>
             <a:r>
-              <a:rPr lang="pl-PL" i="1">
-                <a:latin typeface="Calibri Light"/>
-              </a:rPr>
-              <a:t>.”</a:t>
+              <a:rPr lang="en-US" i="1" dirty="0">
+                <a:latin typeface="Calibri Light"/>
+              </a:rPr>
+              <a:t>.</a:t>
             </a:r>
           </a:p>
         </p:txBody>
@@ -12243,7 +11730,7 @@
           <a:lstStyle/>
           <a:p>
             <a:r>
-              <a:rPr lang="pl-PL">
+              <a:rPr lang="pl-PL" dirty="0">
                 <a:solidFill>
                   <a:schemeClr val="tx1">
                     <a:lumMod val="95000"/>
@@ -12255,7 +11742,7 @@
               <a:t>Przykład </a:t>
             </a:r>
             <a:r>
-              <a:rPr lang="pl-PL" err="1">
+              <a:rPr lang="en-US" dirty="0">
                 <a:solidFill>
                   <a:schemeClr val="tx1">
                     <a:lumMod val="95000"/>
@@ -12266,15 +11753,6 @@
               </a:rPr>
               <a:t>workflow</a:t>
             </a:r>
-            <a:endParaRPr lang="en-US">
-              <a:solidFill>
-                <a:schemeClr val="tx1">
-                  <a:lumMod val="95000"/>
-                  <a:lumOff val="5000"/>
-                </a:schemeClr>
-              </a:solidFill>
-              <a:latin typeface="Calibri Light" panose="020F0302020204030204" pitchFamily="34" charset="0"/>
-            </a:endParaRPr>
           </a:p>
         </p:txBody>
       </p:sp>
@@ -12304,7 +11782,7 @@
               <a:buNone/>
             </a:pPr>
             <a:r>
-              <a:rPr lang="pl-PL" i="1">
+              <a:rPr lang="pl-PL" i="1" dirty="0">
                 <a:solidFill>
                   <a:schemeClr val="bg1">
                     <a:lumMod val="50000"/>
@@ -12321,25 +11799,19 @@
               <a:buChar char="-"/>
             </a:pPr>
             <a:r>
-              <a:rPr lang="pl-PL" i="1" err="1">
-                <a:latin typeface="Calibri Light"/>
-              </a:rPr>
-              <a:t>Requestor</a:t>
-            </a:r>
-            <a:r>
-              <a:rPr lang="pl-PL" i="1">
-                <a:latin typeface="Calibri Light"/>
-              </a:rPr>
-              <a:t>: Story designer (Dan </a:t>
-            </a:r>
-            <a:r>
-              <a:rPr lang="pl-PL" i="1" err="1">
+              <a:rPr lang="en-US" i="1" dirty="0">
+                <a:latin typeface="Calibri Light"/>
+              </a:rPr>
+              <a:t>Requestor: Story designer (Dan </a:t>
+            </a:r>
+            <a:r>
+              <a:rPr lang="en-US" i="1" dirty="0" err="1">
                 <a:latin typeface="Calibri Light"/>
               </a:rPr>
               <a:t>Salvato</a:t>
             </a:r>
             <a:r>
-              <a:rPr lang="pl-PL" i="1">
+              <a:rPr lang="en-US" i="1" dirty="0">
                 <a:latin typeface="Calibri Light"/>
               </a:rPr>
               <a:t>)</a:t>
@@ -12351,25 +11823,19 @@
               <a:buChar char="-"/>
             </a:pPr>
             <a:r>
-              <a:rPr lang="pl-PL" i="1" err="1">
-                <a:latin typeface="Calibri Light"/>
-              </a:rPr>
-              <a:t>Assignee</a:t>
-            </a:r>
-            <a:r>
-              <a:rPr lang="pl-PL" i="1">
-                <a:latin typeface="Calibri Light"/>
-              </a:rPr>
-              <a:t>: Level Designer (Dan </a:t>
-            </a:r>
-            <a:r>
-              <a:rPr lang="pl-PL" i="1" err="1">
+              <a:rPr lang="en-US" i="1" dirty="0">
+                <a:latin typeface="Calibri Light"/>
+              </a:rPr>
+              <a:t>Assignee: Level Designer (Dan </a:t>
+            </a:r>
+            <a:r>
+              <a:rPr lang="en-US" i="1" dirty="0" err="1">
                 <a:latin typeface="Calibri Light"/>
               </a:rPr>
               <a:t>Salvato</a:t>
             </a:r>
             <a:r>
-              <a:rPr lang="pl-PL" i="1">
+              <a:rPr lang="en-US" i="1" dirty="0">
                 <a:latin typeface="Calibri Light"/>
               </a:rPr>
               <a:t>)</a:t>
@@ -12381,406 +11847,88 @@
               <a:buChar char="-"/>
             </a:pPr>
             <a:r>
-              <a:rPr lang="pl-PL" i="1" err="1">
-                <a:latin typeface="Calibri Light"/>
-              </a:rPr>
-              <a:t>Task</a:t>
-            </a:r>
-            <a:r>
-              <a:rPr lang="pl-PL" i="1">
+              <a:rPr lang="en-US" i="1" dirty="0">
+                <a:latin typeface="Calibri Light"/>
+              </a:rPr>
+              <a:t>Task Title</a:t>
+            </a:r>
+            <a:r>
+              <a:rPr lang="pl-PL" i="1" dirty="0">
+                <a:latin typeface="Calibri Light"/>
+              </a:rPr>
+              <a:t>: </a:t>
+            </a:r>
+            <a:r>
+              <a:rPr lang="en-US" i="1" dirty="0">
+                <a:latin typeface="Calibri Light"/>
+              </a:rPr>
+              <a:t>Background for </a:t>
+            </a:r>
+            <a:r>
+              <a:rPr lang="en-US" i="1" dirty="0" err="1">
+                <a:latin typeface="Calibri Light"/>
+              </a:rPr>
+              <a:t>Sayori’s</a:t>
+            </a:r>
+            <a:r>
+              <a:rPr lang="pl-PL" i="1" dirty="0">
                 <a:latin typeface="Calibri Light"/>
               </a:rPr>
               <a:t> </a:t>
             </a:r>
             <a:r>
-              <a:rPr lang="pl-PL" i="1" err="1">
-                <a:latin typeface="Calibri Light"/>
-              </a:rPr>
-              <a:t>Title</a:t>
-            </a:r>
-            <a:r>
-              <a:rPr lang="pl-PL" i="1">
-                <a:latin typeface="Calibri Light"/>
-              </a:rPr>
-              <a:t>: „</a:t>
-            </a:r>
-            <a:r>
-              <a:rPr lang="pl-PL" i="1" err="1">
-                <a:latin typeface="Calibri Light"/>
-              </a:rPr>
-              <a:t>Background</a:t>
-            </a:r>
-            <a:r>
-              <a:rPr lang="pl-PL" i="1">
-                <a:latin typeface="Calibri Light"/>
-              </a:rPr>
-              <a:t> for Sayori's </a:t>
-            </a:r>
-            <a:r>
-              <a:rPr lang="pl-PL" i="1" err="1">
+              <a:rPr lang="en-US" i="1" dirty="0">
                 <a:latin typeface="Calibri Light"/>
               </a:rPr>
               <a:t>room</a:t>
             </a:r>
-            <a:r>
-              <a:rPr lang="pl-PL" i="1">
-                <a:latin typeface="Calibri Light"/>
-              </a:rPr>
-              <a:t>”</a:t>
-            </a:r>
           </a:p>
           <a:p>
             <a:pPr>
-              <a:buFont typeface="Arial"/>
-              <a:buChar char="•"/>
+              <a:buFontTx/>
+              <a:buChar char="-"/>
             </a:pPr>
             <a:r>
-              <a:rPr lang="pl-PL" i="1" err="1">
-                <a:latin typeface="Calibri Light"/>
-              </a:rPr>
-              <a:t>Task</a:t>
-            </a:r>
-            <a:r>
-              <a:rPr lang="pl-PL" i="1">
-                <a:latin typeface="Calibri Light"/>
-              </a:rPr>
-              <a:t> </a:t>
-            </a:r>
-            <a:r>
-              <a:rPr lang="pl-PL" i="1" err="1">
-                <a:latin typeface="Calibri Light"/>
-              </a:rPr>
-              <a:t>Description</a:t>
-            </a:r>
-            <a:r>
-              <a:rPr lang="pl-PL" i="1">
-                <a:latin typeface="Calibri Light"/>
-              </a:rPr>
-              <a:t>: „We </a:t>
-            </a:r>
-            <a:r>
-              <a:rPr lang="pl-PL" i="1" err="1">
-                <a:latin typeface="Calibri Light"/>
-              </a:rPr>
-              <a:t>need</a:t>
-            </a:r>
-            <a:r>
-              <a:rPr lang="pl-PL" i="1">
-                <a:latin typeface="Calibri Light"/>
-              </a:rPr>
-              <a:t> a design for </a:t>
-            </a:r>
-            <a:r>
-              <a:rPr lang="pl-PL" i="1" err="1">
+              <a:rPr lang="en-US" i="1" dirty="0">
+                <a:latin typeface="Calibri Light"/>
+              </a:rPr>
+              <a:t>Task Description: We need a design for </a:t>
+            </a:r>
+            <a:r>
+              <a:rPr lang="en-US" i="1" dirty="0" err="1">
                 <a:latin typeface="Calibri Light"/>
               </a:rPr>
               <a:t>Sayori's</a:t>
             </a:r>
             <a:r>
-              <a:rPr lang="pl-PL" i="1">
-                <a:latin typeface="Calibri Light"/>
-              </a:rPr>
-              <a:t> </a:t>
-            </a:r>
-            <a:r>
-              <a:rPr lang="pl-PL" i="1" err="1">
-                <a:latin typeface="Calibri Light"/>
-              </a:rPr>
-              <a:t>room</a:t>
-            </a:r>
-            <a:r>
-              <a:rPr lang="pl-PL" i="1">
-                <a:latin typeface="Calibri Light"/>
-              </a:rPr>
-              <a:t>. It </a:t>
-            </a:r>
-            <a:r>
-              <a:rPr lang="pl-PL" i="1" err="1">
-                <a:latin typeface="Calibri Light"/>
-              </a:rPr>
-              <a:t>will</a:t>
-            </a:r>
-            <a:r>
-              <a:rPr lang="pl-PL" i="1">
-                <a:latin typeface="Calibri Light"/>
-              </a:rPr>
-              <a:t> be </a:t>
-            </a:r>
-            <a:r>
-              <a:rPr lang="pl-PL" i="1" err="1">
-                <a:latin typeface="Calibri Light"/>
-              </a:rPr>
-              <a:t>used</a:t>
-            </a:r>
-            <a:r>
-              <a:rPr lang="pl-PL" i="1">
-                <a:latin typeface="Calibri Light"/>
-              </a:rPr>
-              <a:t> in the end of </a:t>
-            </a:r>
-            <a:r>
-              <a:rPr lang="pl-PL" i="1" err="1">
-                <a:latin typeface="Calibri Light"/>
-              </a:rPr>
-              <a:t>Act</a:t>
-            </a:r>
-            <a:r>
-              <a:rPr lang="pl-PL" i="1">
-                <a:latin typeface="Calibri Light"/>
-              </a:rPr>
-              <a:t> I </a:t>
-            </a:r>
-            <a:r>
-              <a:rPr lang="pl-PL" i="1" err="1">
-                <a:latin typeface="Calibri Light"/>
-              </a:rPr>
-              <a:t>where</a:t>
-            </a:r>
-            <a:r>
-              <a:rPr lang="pl-PL" i="1">
-                <a:latin typeface="Calibri Light"/>
-              </a:rPr>
-              <a:t> </a:t>
-            </a:r>
-            <a:r>
-              <a:rPr lang="pl-PL" i="1" err="1">
+              <a:rPr lang="en-US" i="1" dirty="0">
+                <a:latin typeface="Calibri Light"/>
+              </a:rPr>
+              <a:t> room. It will be used in the end of Act I where </a:t>
+            </a:r>
+            <a:r>
+              <a:rPr lang="en-US" i="1" dirty="0" err="1">
                 <a:latin typeface="Calibri Light"/>
               </a:rPr>
               <a:t>Sayori</a:t>
             </a:r>
             <a:r>
-              <a:rPr lang="pl-PL" i="1">
-                <a:latin typeface="Calibri Light"/>
-              </a:rPr>
-              <a:t> </a:t>
-            </a:r>
-            <a:r>
-              <a:rPr lang="pl-PL" i="1" err="1">
-                <a:latin typeface="Calibri Light"/>
-              </a:rPr>
-              <a:t>is</a:t>
-            </a:r>
-            <a:r>
-              <a:rPr lang="pl-PL" i="1">
-                <a:latin typeface="Calibri Light"/>
-              </a:rPr>
-              <a:t> in </a:t>
-            </a:r>
-            <a:r>
-              <a:rPr lang="pl-PL" i="1" err="1">
-                <a:latin typeface="Calibri Light"/>
-              </a:rPr>
-              <a:t>very</a:t>
-            </a:r>
-            <a:r>
-              <a:rPr lang="pl-PL" i="1">
-                <a:latin typeface="Calibri Light"/>
-              </a:rPr>
-              <a:t> </a:t>
-            </a:r>
-            <a:r>
-              <a:rPr lang="pl-PL" i="1" err="1">
-                <a:latin typeface="Calibri Light"/>
-              </a:rPr>
-              <a:t>deep</a:t>
-            </a:r>
-            <a:r>
-              <a:rPr lang="pl-PL" i="1">
-                <a:latin typeface="Calibri Light"/>
-              </a:rPr>
-              <a:t> </a:t>
-            </a:r>
-            <a:r>
-              <a:rPr lang="pl-PL" i="1" err="1">
-                <a:latin typeface="Calibri Light"/>
-              </a:rPr>
-              <a:t>state</a:t>
-            </a:r>
-            <a:r>
-              <a:rPr lang="pl-PL" i="1">
-                <a:latin typeface="Calibri Light"/>
-              </a:rPr>
-              <a:t> of </a:t>
-            </a:r>
-            <a:r>
-              <a:rPr lang="pl-PL" i="1" err="1">
-                <a:latin typeface="Calibri Light"/>
-              </a:rPr>
-              <a:t>depression</a:t>
-            </a:r>
-            <a:r>
-              <a:rPr lang="pl-PL" i="1">
-                <a:latin typeface="Calibri Light"/>
-              </a:rPr>
-              <a:t> and </a:t>
-            </a:r>
-            <a:r>
-              <a:rPr lang="pl-PL" i="1" err="1">
-                <a:latin typeface="Calibri Light"/>
-              </a:rPr>
-              <a:t>there</a:t>
-            </a:r>
-            <a:r>
-              <a:rPr lang="pl-PL" i="1">
-                <a:latin typeface="Calibri Light"/>
-              </a:rPr>
-              <a:t> </a:t>
-            </a:r>
-            <a:r>
-              <a:rPr lang="pl-PL" i="1" err="1">
-                <a:latin typeface="Calibri Light"/>
-              </a:rPr>
-              <a:t>is</a:t>
-            </a:r>
-            <a:r>
-              <a:rPr lang="pl-PL" i="1">
-                <a:latin typeface="Calibri Light"/>
-              </a:rPr>
-              <a:t> real mess in </a:t>
-            </a:r>
-            <a:r>
-              <a:rPr lang="pl-PL" i="1" err="1">
-                <a:latin typeface="Calibri Light"/>
-              </a:rPr>
-              <a:t>her</a:t>
-            </a:r>
-            <a:r>
-              <a:rPr lang="pl-PL" i="1">
-                <a:latin typeface="Calibri Light"/>
-              </a:rPr>
-              <a:t> </a:t>
-            </a:r>
-            <a:r>
-              <a:rPr lang="pl-PL" i="1" err="1">
-                <a:latin typeface="Calibri Light"/>
-              </a:rPr>
-              <a:t>room</a:t>
-            </a:r>
-            <a:r>
-              <a:rPr lang="pl-PL" i="1">
-                <a:latin typeface="Calibri Light"/>
-              </a:rPr>
-              <a:t>. </a:t>
-            </a:r>
-            <a:r>
-              <a:rPr lang="pl-PL" i="1" err="1">
-                <a:latin typeface="Calibri Light"/>
-              </a:rPr>
-              <a:t>More</a:t>
-            </a:r>
-            <a:r>
-              <a:rPr lang="pl-PL" i="1">
-                <a:latin typeface="Calibri Light"/>
-              </a:rPr>
-              <a:t> </a:t>
-            </a:r>
-            <a:r>
-              <a:rPr lang="pl-PL" i="1" err="1">
-                <a:latin typeface="Calibri Light"/>
-              </a:rPr>
-              <a:t>information</a:t>
-            </a:r>
-            <a:r>
-              <a:rPr lang="pl-PL" i="1">
-                <a:latin typeface="Calibri Light"/>
-              </a:rPr>
-              <a:t> </a:t>
-            </a:r>
-            <a:r>
-              <a:rPr lang="pl-PL" i="1" err="1">
-                <a:latin typeface="Calibri Light"/>
-              </a:rPr>
-              <a:t>about</a:t>
-            </a:r>
-            <a:r>
-              <a:rPr lang="pl-PL" i="1">
-                <a:latin typeface="Calibri Light"/>
-              </a:rPr>
-              <a:t> </a:t>
-            </a:r>
-            <a:r>
-              <a:rPr lang="pl-PL" i="1" err="1">
+              <a:rPr lang="en-US" i="1" dirty="0">
+                <a:latin typeface="Calibri Light"/>
+              </a:rPr>
+              <a:t> is in very deep state of depression and there is real mess in her room. More information about </a:t>
+            </a:r>
+            <a:r>
+              <a:rPr lang="en-US" i="1" dirty="0" err="1">
                 <a:latin typeface="Calibri Light"/>
               </a:rPr>
               <a:t>Sayori's</a:t>
             </a:r>
             <a:r>
-              <a:rPr lang="pl-PL" i="1">
-                <a:latin typeface="Calibri Light"/>
-              </a:rPr>
-              <a:t> </a:t>
-            </a:r>
-            <a:r>
-              <a:rPr lang="pl-PL" i="1" err="1">
-                <a:latin typeface="Calibri Light"/>
-              </a:rPr>
-              <a:t>character</a:t>
-            </a:r>
-            <a:r>
-              <a:rPr lang="pl-PL" i="1">
-                <a:latin typeface="Calibri Light"/>
-              </a:rPr>
-              <a:t> </a:t>
-            </a:r>
-            <a:r>
-              <a:rPr lang="pl-PL" i="1" err="1">
-                <a:latin typeface="Calibri Light"/>
-              </a:rPr>
-              <a:t>can</a:t>
-            </a:r>
-            <a:r>
-              <a:rPr lang="pl-PL" i="1">
-                <a:latin typeface="Calibri Light"/>
-              </a:rPr>
-              <a:t> be </a:t>
-            </a:r>
-            <a:r>
-              <a:rPr lang="pl-PL" i="1" err="1">
-                <a:latin typeface="Calibri Light"/>
-              </a:rPr>
-              <a:t>found</a:t>
-            </a:r>
-            <a:r>
-              <a:rPr lang="pl-PL" i="1">
-                <a:latin typeface="Calibri Light"/>
-              </a:rPr>
-              <a:t> in the </a:t>
-            </a:r>
-            <a:r>
-              <a:rPr lang="pl-PL" i="1" err="1">
-                <a:latin typeface="Calibri Light"/>
-              </a:rPr>
-              <a:t>documentation</a:t>
-            </a:r>
-            <a:r>
-              <a:rPr lang="pl-PL" i="1">
-                <a:latin typeface="Calibri Light"/>
-              </a:rPr>
-              <a:t> for </a:t>
-            </a:r>
-            <a:r>
-              <a:rPr lang="pl-PL" i="1" err="1">
-                <a:latin typeface="Calibri Light"/>
-              </a:rPr>
-              <a:t>this</a:t>
-            </a:r>
-            <a:r>
-              <a:rPr lang="pl-PL" i="1">
-                <a:latin typeface="Calibri Light"/>
-              </a:rPr>
-              <a:t> </a:t>
-            </a:r>
-            <a:r>
-              <a:rPr lang="pl-PL" i="1" err="1">
-                <a:latin typeface="Calibri Light"/>
-              </a:rPr>
-              <a:t>project</a:t>
-            </a:r>
-            <a:r>
-              <a:rPr lang="pl-PL" i="1">
-                <a:latin typeface="Calibri Light"/>
-              </a:rPr>
-              <a:t>.”</a:t>
+              <a:rPr lang="en-US" i="1" dirty="0">
+                <a:latin typeface="Calibri Light"/>
+              </a:rPr>
+              <a:t> character can be found in the documentation for this project.</a:t>
             </a:r>
           </a:p>
         </p:txBody>
@@ -13219,7 +12367,7 @@
           <a:lstStyle/>
           <a:p>
             <a:r>
-              <a:rPr lang="pl-PL" sz="4000">
+              <a:rPr lang="en-US" sz="4000" dirty="0">
                 <a:solidFill>
                   <a:schemeClr val="tx1">
                     <a:lumMod val="95000"/>
@@ -13228,10 +12376,10 @@
                 </a:solidFill>
                 <a:latin typeface="Calibri Light" panose="020F0302020204030204" pitchFamily="34" charset="0"/>
               </a:rPr>
-              <a:t>Player </a:t>
-            </a:r>
-            <a:r>
-              <a:rPr lang="pl-PL" sz="4000" err="1">
+              <a:t>Player Experience</a:t>
+            </a:r>
+            <a:r>
+              <a:rPr lang="pl-PL" sz="4000" dirty="0">
                 <a:solidFill>
                   <a:schemeClr val="tx1">
                     <a:lumMod val="95000"/>
@@ -13240,21 +12388,9 @@
                 </a:solidFill>
                 <a:latin typeface="Calibri Light" panose="020F0302020204030204" pitchFamily="34" charset="0"/>
               </a:rPr>
-              <a:t>Experience</a:t>
-            </a:r>
-            <a:r>
-              <a:rPr lang="pl-PL" sz="4000">
-                <a:solidFill>
-                  <a:schemeClr val="tx1">
-                    <a:lumMod val="95000"/>
-                    <a:lumOff val="5000"/>
-                  </a:schemeClr>
-                </a:solidFill>
-                <a:latin typeface="Calibri Light" panose="020F0302020204030204" pitchFamily="34" charset="0"/>
-              </a:rPr>
               <a:t>: Podróż gracza</a:t>
             </a:r>
-            <a:endParaRPr lang="en-US" sz="4000">
+            <a:endParaRPr lang="en-US" sz="4000" dirty="0">
               <a:solidFill>
                 <a:schemeClr val="tx1">
                   <a:lumMod val="95000"/>
@@ -13745,8 +12881,306 @@
         </p:nvSpPr>
         <p:spPr>
           <a:xfrm>
-            <a:off x="609600" y="3470051"/>
-            <a:ext cx="1904983" cy="1904983"/>
+            <a:off x="609601" y="3045962"/>
+            <a:ext cx="1640540" cy="2768901"/>
+          </a:xfrm>
+          <a:prstGeom prst="rect">
+            <a:avLst/>
+          </a:prstGeom>
+        </p:spPr>
+        <p:style>
+          <a:lnRef idx="2">
+            <a:schemeClr val="accent3">
+              <a:shade val="50000"/>
+            </a:schemeClr>
+          </a:lnRef>
+          <a:fillRef idx="1">
+            <a:schemeClr val="accent3"/>
+          </a:fillRef>
+          <a:effectRef idx="0">
+            <a:schemeClr val="accent3"/>
+          </a:effectRef>
+          <a:fontRef idx="minor">
+            <a:schemeClr val="lt1"/>
+          </a:fontRef>
+        </p:style>
+        <p:txBody>
+          <a:bodyPr rot="0" spcFirstLastPara="0" vertOverflow="overflow" horzOverflow="overflow" vert="horz" wrap="square" lIns="91440" tIns="45720" rIns="91440" bIns="45720" numCol="1" spcCol="0" rtlCol="0" fromWordArt="0" anchor="ctr" anchorCtr="0" forceAA="0" compatLnSpc="1">
+            <a:prstTxWarp prst="textNoShape">
+              <a:avLst/>
+            </a:prstTxWarp>
+            <a:noAutofit/>
+          </a:bodyPr>
+          <a:lstStyle/>
+          <a:p>
+            <a:pPr algn="ctr"/>
+            <a:r>
+              <a:rPr lang="pl-PL" sz="1000" dirty="0">
+                <a:ln w="0"/>
+                <a:solidFill>
+                  <a:schemeClr val="tx1"/>
+                </a:solidFill>
+                <a:effectLst>
+                  <a:outerShdw blurRad="38100" dist="19050" dir="2700000" algn="tl" rotWithShape="0">
+                    <a:schemeClr val="dk1">
+                      <a:alpha val="40000"/>
+                    </a:schemeClr>
+                  </a:outerShdw>
+                </a:effectLst>
+              </a:rPr>
+              <a:t>Pierwszy akt prowadzi gracza przez historię, która zdawać by się mogło jest typową historią miłosną w liceum. Wraz z postępem historii gracz dostaje pewne wskazówki, że coś może być nie tak, jednak większość osób się tym nie przejmuje.</a:t>
+            </a:r>
+            <a:r>
+              <a:rPr lang="en-US" sz="1000" dirty="0">
+                <a:ln w="0"/>
+                <a:solidFill>
+                  <a:schemeClr val="tx1"/>
+                </a:solidFill>
+                <a:effectLst>
+                  <a:outerShdw blurRad="38100" dist="19050" dir="2700000" algn="tl" rotWithShape="0">
+                    <a:schemeClr val="dk1">
+                      <a:alpha val="40000"/>
+                    </a:schemeClr>
+                  </a:outerShdw>
+                </a:effectLst>
+              </a:rPr>
+              <a:t> </a:t>
+            </a:r>
+            <a:r>
+              <a:rPr lang="pl-PL" sz="1000" dirty="0">
+                <a:ln w="0"/>
+                <a:solidFill>
+                  <a:schemeClr val="tx1"/>
+                </a:solidFill>
+                <a:effectLst>
+                  <a:outerShdw blurRad="38100" dist="19050" dir="2700000" algn="tl" rotWithShape="0">
+                    <a:schemeClr val="dk1">
+                      <a:alpha val="40000"/>
+                    </a:schemeClr>
+                  </a:outerShdw>
+                </a:effectLst>
+              </a:rPr>
+              <a:t>Kubeł zimnej wody na gracza spada, gdy widzi zakończenie pierwszego etapu i napis </a:t>
+            </a:r>
+            <a:r>
+              <a:rPr lang="en-US" sz="1000" dirty="0">
+                <a:ln w="0"/>
+                <a:solidFill>
+                  <a:schemeClr val="tx1"/>
+                </a:solidFill>
+                <a:effectLst>
+                  <a:outerShdw blurRad="38100" dist="19050" dir="2700000" algn="tl" rotWithShape="0">
+                    <a:schemeClr val="dk1">
+                      <a:alpha val="40000"/>
+                    </a:schemeClr>
+                  </a:outerShdw>
+                </a:effectLst>
+              </a:rPr>
+              <a:t>“The End”. </a:t>
+            </a:r>
+            <a:r>
+              <a:rPr lang="pl-PL" sz="1000" dirty="0">
+                <a:ln w="0"/>
+                <a:solidFill>
+                  <a:schemeClr val="tx1"/>
+                </a:solidFill>
+                <a:effectLst>
+                  <a:outerShdw blurRad="38100" dist="19050" dir="2700000" algn="tl" rotWithShape="0">
+                    <a:schemeClr val="dk1">
+                      <a:alpha val="40000"/>
+                    </a:schemeClr>
+                  </a:outerShdw>
+                </a:effectLst>
+              </a:rPr>
+              <a:t>Niektórzy gracze po tym przestają grać, jednak wtedy nie są oni w stanie odczuć tego co mieli na myśli twórcy gry.</a:t>
+            </a:r>
+          </a:p>
+        </p:txBody>
+      </p:sp>
+      <p:sp>
+        <p:nvSpPr>
+          <p:cNvPr id="21" name="Rectangle 20">
+            <a:extLst>
+              <a:ext uri="{FF2B5EF4-FFF2-40B4-BE49-F238E27FC236}">
+                <a16:creationId xmlns:a16="http://schemas.microsoft.com/office/drawing/2014/main" id="{DC294212-146C-49E2-AF47-64EB7B2F69FC}"/>
+              </a:ext>
+            </a:extLst>
+          </p:cNvPr>
+          <p:cNvSpPr/>
+          <p:nvPr/>
+        </p:nvSpPr>
+        <p:spPr>
+          <a:xfrm>
+            <a:off x="2326340" y="3045962"/>
+            <a:ext cx="1640540" cy="2768901"/>
+          </a:xfrm>
+          <a:prstGeom prst="rect">
+            <a:avLst/>
+          </a:prstGeom>
+        </p:spPr>
+        <p:style>
+          <a:lnRef idx="2">
+            <a:schemeClr val="accent6">
+              <a:shade val="50000"/>
+            </a:schemeClr>
+          </a:lnRef>
+          <a:fillRef idx="1">
+            <a:schemeClr val="accent6"/>
+          </a:fillRef>
+          <a:effectRef idx="0">
+            <a:schemeClr val="accent6"/>
+          </a:effectRef>
+          <a:fontRef idx="minor">
+            <a:schemeClr val="lt1"/>
+          </a:fontRef>
+        </p:style>
+        <p:txBody>
+          <a:bodyPr rot="0" spcFirstLastPara="0" vertOverflow="overflow" horzOverflow="overflow" vert="horz" wrap="square" lIns="91440" tIns="45720" rIns="91440" bIns="45720" numCol="1" spcCol="0" rtlCol="0" fromWordArt="0" anchor="ctr" anchorCtr="0" forceAA="0" compatLnSpc="1">
+            <a:prstTxWarp prst="textNoShape">
+              <a:avLst/>
+            </a:prstTxWarp>
+            <a:noAutofit/>
+          </a:bodyPr>
+          <a:lstStyle/>
+          <a:p>
+            <a:pPr algn="ctr"/>
+            <a:r>
+              <a:rPr lang="pl-PL" sz="700" dirty="0">
+                <a:ln w="0"/>
+                <a:solidFill>
+                  <a:schemeClr val="tx1"/>
+                </a:solidFill>
+                <a:effectLst>
+                  <a:outerShdw blurRad="38100" dist="19050" dir="2700000" algn="tl" rotWithShape="0">
+                    <a:schemeClr val="dk1">
+                      <a:alpha val="40000"/>
+                    </a:schemeClr>
+                  </a:outerShdw>
+                </a:effectLst>
+              </a:rPr>
+              <a:t>Kontynuacja gry polega na rozpoczęciu gry od nowa. Gracz na początku może myśleć, że robiąc coś inaczej może osiągnąć inny wynik niż poprzednio, bo to przecież nowe podejście. Szybko jednak zauważa, że postać, która popełniła samobójstwo w akcie I jest w grze nieobecna. Pod innymi względami rozgrywka wydaje się normalna. Gra jednak co jakiś czas się “</a:t>
+            </a:r>
+            <a:r>
+              <a:rPr lang="pl-PL" sz="700" dirty="0" err="1">
+                <a:ln w="0"/>
+                <a:solidFill>
+                  <a:schemeClr val="tx1"/>
+                </a:solidFill>
+                <a:effectLst>
+                  <a:outerShdw blurRad="38100" dist="19050" dir="2700000" algn="tl" rotWithShape="0">
+                    <a:schemeClr val="dk1">
+                      <a:alpha val="40000"/>
+                    </a:schemeClr>
+                  </a:outerShdw>
+                </a:effectLst>
+              </a:rPr>
+              <a:t>buguje</a:t>
+            </a:r>
+            <a:r>
+              <a:rPr lang="pl-PL" sz="700" dirty="0">
+                <a:ln w="0"/>
+                <a:solidFill>
+                  <a:schemeClr val="tx1"/>
+                </a:solidFill>
+                <a:effectLst>
+                  <a:outerShdw blurRad="38100" dist="19050" dir="2700000" algn="tl" rotWithShape="0">
+                    <a:schemeClr val="dk1">
+                      <a:alpha val="40000"/>
+                    </a:schemeClr>
+                  </a:outerShdw>
+                </a:effectLst>
+              </a:rPr>
+              <a:t>“ powodując pewne złe przeczucia u gracza. W ciągu 3 dnia czasu gry gracz zauważa, że coś mocno jest nie tak i stamtąd gra prowadzi go do nie uchronnego zakończenia etapu, którym jest samobójstwo kolejnej postaci. Po tym wydarzeniu leaderka klubu postanawia się ujawnić i pokazać, że to ona za tym wszystkim stoi i że ona jako jedyna z tych postaci jest świadoma tego, że jest w grze i że jedyną żywą istotą poza nią jest gracz (złamanie 4 ściany). Wtedy gra płynnie przechodzi do etapu III.</a:t>
+            </a:r>
+          </a:p>
+        </p:txBody>
+      </p:sp>
+      <p:sp>
+        <p:nvSpPr>
+          <p:cNvPr id="22" name="Rectangle 21">
+            <a:extLst>
+              <a:ext uri="{FF2B5EF4-FFF2-40B4-BE49-F238E27FC236}">
+                <a16:creationId xmlns:a16="http://schemas.microsoft.com/office/drawing/2014/main" id="{959343F7-6F04-40AD-AE26-4D16FD31DC75}"/>
+              </a:ext>
+            </a:extLst>
+          </p:cNvPr>
+          <p:cNvSpPr/>
+          <p:nvPr/>
+        </p:nvSpPr>
+        <p:spPr>
+          <a:xfrm>
+            <a:off x="4020668" y="3045961"/>
+            <a:ext cx="1640540" cy="2768901"/>
+          </a:xfrm>
+          <a:prstGeom prst="rect">
+            <a:avLst/>
+          </a:prstGeom>
+        </p:spPr>
+        <p:style>
+          <a:lnRef idx="2">
+            <a:schemeClr val="accent2">
+              <a:shade val="50000"/>
+            </a:schemeClr>
+          </a:lnRef>
+          <a:fillRef idx="1">
+            <a:schemeClr val="accent2"/>
+          </a:fillRef>
+          <a:effectRef idx="0">
+            <a:schemeClr val="accent2"/>
+          </a:effectRef>
+          <a:fontRef idx="minor">
+            <a:schemeClr val="lt1"/>
+          </a:fontRef>
+        </p:style>
+        <p:txBody>
+          <a:bodyPr rot="0" spcFirstLastPara="0" vertOverflow="overflow" horzOverflow="overflow" vert="horz" wrap="square" lIns="91440" tIns="45720" rIns="91440" bIns="45720" numCol="1" spcCol="0" rtlCol="0" fromWordArt="0" anchor="ctr" anchorCtr="0" forceAA="0" compatLnSpc="1">
+            <a:prstTxWarp prst="textNoShape">
+              <a:avLst/>
+            </a:prstTxWarp>
+            <a:noAutofit/>
+          </a:bodyPr>
+          <a:lstStyle/>
+          <a:p>
+            <a:pPr algn="ctr">
+              <a:lnSpc>
+                <a:spcPct val="125000"/>
+              </a:lnSpc>
+            </a:pPr>
+            <a:r>
+              <a:rPr lang="pl-PL" sz="700" dirty="0">
+                <a:ln w="0"/>
+                <a:solidFill>
+                  <a:schemeClr val="tx1"/>
+                </a:solidFill>
+                <a:effectLst>
+                  <a:outerShdw blurRad="38100" dist="19050" dir="2700000" algn="tl" rotWithShape="0">
+                    <a:schemeClr val="dk1">
+                      <a:alpha val="40000"/>
+                    </a:schemeClr>
+                  </a:outerShdw>
+                </a:effectLst>
+              </a:rPr>
+              <a:t>Trzeci etap polega na byciu zamkniętym w pokoju z Moniką bez żadnej możliwości interakcji bądź wykonania żadnej akcji innej niż słuchanie jej historii. Gra wtedy się blokuje i nawet gdy skończą się wszystkie kwestie Moniki zaczynają się one zapętlać. Co jakiś czas gracz dostaje pewne sugestie, żeby zmodyfikować pliki gry. Dopiero wtedy, gdy gracz faktycznie wejdzie do folderu, gdzie zainstalowana jest gra i usunie plik odpowiedzialny za postać Moniki gra pozwala iść na przód. Duch Moniki (sama postać znika “z powodu usunięcia pliku”) wtedy uświadamia sobie, że zamknięcie gracza w pokoju nie było najlepszym rozwiązaniem. Akceptuje swoją karę i jako ostatnie swoje działanie przywraca pliki innych postaci. To nadal nie jest koniec.</a:t>
+            </a:r>
+          </a:p>
+        </p:txBody>
+      </p:sp>
+      <p:sp>
+        <p:nvSpPr>
+          <p:cNvPr id="23" name="Rectangle 22">
+            <a:extLst>
+              <a:ext uri="{FF2B5EF4-FFF2-40B4-BE49-F238E27FC236}">
+                <a16:creationId xmlns:a16="http://schemas.microsoft.com/office/drawing/2014/main" id="{F5B20603-7E7D-46E6-8936-7B04CAAF211E}"/>
+              </a:ext>
+            </a:extLst>
+          </p:cNvPr>
+          <p:cNvSpPr/>
+          <p:nvPr/>
+        </p:nvSpPr>
+        <p:spPr>
+          <a:xfrm>
+            <a:off x="5777760" y="3045961"/>
+            <a:ext cx="1501929" cy="2768901"/>
           </a:xfrm>
           <a:prstGeom prst="rect">
             <a:avLst/>
@@ -13778,19 +13212,436 @@
           <a:lstStyle/>
           <a:p>
             <a:pPr algn="ctr"/>
-            <a:endParaRPr lang="en-US">
-              <a:ln w="0"/>
-              <a:solidFill>
-                <a:schemeClr val="tx1"/>
-              </a:solidFill>
-              <a:effectLst>
-                <a:outerShdw blurRad="38100" dist="19050" dir="2700000" algn="tl" rotWithShape="0">
-                  <a:schemeClr val="dk1">
-                    <a:alpha val="40000"/>
-                  </a:schemeClr>
-                </a:outerShdw>
-              </a:effectLst>
-            </a:endParaRPr>
+            <a:r>
+              <a:rPr lang="pl-PL" sz="900" dirty="0">
+                <a:ln w="0"/>
+                <a:solidFill>
+                  <a:schemeClr val="tx1"/>
+                </a:solidFill>
+                <a:effectLst>
+                  <a:outerShdw blurRad="38100" dist="19050" dir="2700000" algn="tl" rotWithShape="0">
+                    <a:schemeClr val="dk1">
+                      <a:alpha val="40000"/>
+                    </a:schemeClr>
+                  </a:outerShdw>
+                </a:effectLst>
+              </a:rPr>
+              <a:t>Trzeci etap zapowiada się na w końcu normalną rozgrywkę. Monika, która powodowała wszystkie zaburzenia charakterów postaci, nie istnieje. Etap ten trwa jednak bardzo krótko, ponieważ już w ciągu pierwszego dnia nowy leader grupy – </a:t>
+            </a:r>
+            <a:r>
+              <a:rPr lang="pl-PL" sz="900" dirty="0" err="1">
+                <a:ln w="0"/>
+                <a:solidFill>
+                  <a:schemeClr val="tx1"/>
+                </a:solidFill>
+                <a:effectLst>
+                  <a:outerShdw blurRad="38100" dist="19050" dir="2700000" algn="tl" rotWithShape="0">
+                    <a:schemeClr val="dk1">
+                      <a:alpha val="40000"/>
+                    </a:schemeClr>
+                  </a:outerShdw>
+                </a:effectLst>
+              </a:rPr>
+              <a:t>Sayori</a:t>
+            </a:r>
+            <a:r>
+              <a:rPr lang="pl-PL" sz="900" dirty="0">
+                <a:ln w="0"/>
+                <a:solidFill>
+                  <a:schemeClr val="tx1"/>
+                </a:solidFill>
+                <a:effectLst>
+                  <a:outerShdw blurRad="38100" dist="19050" dir="2700000" algn="tl" rotWithShape="0">
+                    <a:schemeClr val="dk1">
+                      <a:alpha val="40000"/>
+                    </a:schemeClr>
+                  </a:outerShdw>
+                </a:effectLst>
+              </a:rPr>
+              <a:t> ujawnia się, że jest świadoma swojego istnienia i tego, że jest zamknięta w grze. Próbuje wziąć gracza tylko dla siebie (tak jak zrobiła to Monika) jednak jej się to nie udaje i gra się kończy.</a:t>
+            </a:r>
+          </a:p>
+        </p:txBody>
+      </p:sp>
+      <p:pic>
+        <p:nvPicPr>
+          <p:cNvPr id="1026" name="Picture 2" descr="Image result for sayori hanging">
+            <a:extLst>
+              <a:ext uri="{FF2B5EF4-FFF2-40B4-BE49-F238E27FC236}">
+                <a16:creationId xmlns:a16="http://schemas.microsoft.com/office/drawing/2014/main" id="{36A251EC-D8F5-4148-8B19-02439F64DD31}"/>
+              </a:ext>
+            </a:extLst>
+          </p:cNvPr>
+          <p:cNvPicPr>
+            <a:picLocks noChangeAspect="1" noChangeArrowheads="1"/>
+          </p:cNvPicPr>
+          <p:nvPr/>
+        </p:nvPicPr>
+        <p:blipFill>
+          <a:blip r:embed="rId3">
+            <a:extLst>
+              <a:ext uri="{28A0092B-C50C-407E-A947-70E740481C1C}">
+                <a14:useLocalDpi xmlns:a14="http://schemas.microsoft.com/office/drawing/2010/main" val="0"/>
+              </a:ext>
+            </a:extLst>
+          </a:blip>
+          <a:srcRect/>
+          <a:stretch>
+            <a:fillRect/>
+          </a:stretch>
+        </p:blipFill>
+        <p:spPr bwMode="auto">
+          <a:xfrm>
+            <a:off x="2065682" y="1832925"/>
+            <a:ext cx="368917" cy="368917"/>
+          </a:xfrm>
+          <a:prstGeom prst="rect">
+            <a:avLst/>
+          </a:prstGeom>
+          <a:noFill/>
+          <a:extLst>
+            <a:ext uri="{909E8E84-426E-40DD-AFC4-6F175D3DCCD1}">
+              <a14:hiddenFill xmlns:a14="http://schemas.microsoft.com/office/drawing/2010/main">
+                <a:solidFill>
+                  <a:srgbClr val="FFFFFF"/>
+                </a:solidFill>
+              </a14:hiddenFill>
+            </a:ext>
+          </a:extLst>
+        </p:spPr>
+      </p:pic>
+      <p:pic>
+        <p:nvPicPr>
+          <p:cNvPr id="1028" name="Picture 4" descr="Image result for yuri stab">
+            <a:extLst>
+              <a:ext uri="{FF2B5EF4-FFF2-40B4-BE49-F238E27FC236}">
+                <a16:creationId xmlns:a16="http://schemas.microsoft.com/office/drawing/2014/main" id="{7DB47AB9-00FC-41CD-8C56-B528D9E2839E}"/>
+              </a:ext>
+            </a:extLst>
+          </p:cNvPr>
+          <p:cNvPicPr>
+            <a:picLocks noChangeAspect="1" noChangeArrowheads="1"/>
+          </p:cNvPicPr>
+          <p:nvPr/>
+        </p:nvPicPr>
+        <p:blipFill>
+          <a:blip r:embed="rId4">
+            <a:extLst>
+              <a:ext uri="{28A0092B-C50C-407E-A947-70E740481C1C}">
+                <a14:useLocalDpi xmlns:a14="http://schemas.microsoft.com/office/drawing/2010/main" val="0"/>
+              </a:ext>
+            </a:extLst>
+          </a:blip>
+          <a:srcRect/>
+          <a:stretch>
+            <a:fillRect/>
+          </a:stretch>
+        </p:blipFill>
+        <p:spPr bwMode="auto">
+          <a:xfrm>
+            <a:off x="3898260" y="1811926"/>
+            <a:ext cx="208962" cy="368909"/>
+          </a:xfrm>
+          <a:prstGeom prst="rect">
+            <a:avLst/>
+          </a:prstGeom>
+          <a:noFill/>
+          <a:extLst>
+            <a:ext uri="{909E8E84-426E-40DD-AFC4-6F175D3DCCD1}">
+              <a14:hiddenFill xmlns:a14="http://schemas.microsoft.com/office/drawing/2010/main">
+                <a:solidFill>
+                  <a:srgbClr val="FFFFFF"/>
+                </a:solidFill>
+              </a14:hiddenFill>
+            </a:ext>
+          </a:extLst>
+        </p:spPr>
+      </p:pic>
+      <p:pic>
+        <p:nvPicPr>
+          <p:cNvPr id="1030" name="Picture 6" descr="Image result for monika in the room">
+            <a:extLst>
+              <a:ext uri="{FF2B5EF4-FFF2-40B4-BE49-F238E27FC236}">
+                <a16:creationId xmlns:a16="http://schemas.microsoft.com/office/drawing/2014/main" id="{CFDDE40B-76F3-40AF-8090-35BDB224C891}"/>
+              </a:ext>
+            </a:extLst>
+          </p:cNvPr>
+          <p:cNvPicPr>
+            <a:picLocks noChangeAspect="1" noChangeArrowheads="1"/>
+          </p:cNvPicPr>
+          <p:nvPr/>
+        </p:nvPicPr>
+        <p:blipFill>
+          <a:blip r:embed="rId5">
+            <a:extLst>
+              <a:ext uri="{28A0092B-C50C-407E-A947-70E740481C1C}">
+                <a14:useLocalDpi xmlns:a14="http://schemas.microsoft.com/office/drawing/2010/main" val="0"/>
+              </a:ext>
+            </a:extLst>
+          </a:blip>
+          <a:srcRect/>
+          <a:stretch>
+            <a:fillRect/>
+          </a:stretch>
+        </p:blipFill>
+        <p:spPr bwMode="auto">
+          <a:xfrm>
+            <a:off x="4359055" y="1930783"/>
+            <a:ext cx="963765" cy="542118"/>
+          </a:xfrm>
+          <a:prstGeom prst="rect">
+            <a:avLst/>
+          </a:prstGeom>
+          <a:noFill/>
+          <a:extLst>
+            <a:ext uri="{909E8E84-426E-40DD-AFC4-6F175D3DCCD1}">
+              <a14:hiddenFill xmlns:a14="http://schemas.microsoft.com/office/drawing/2010/main">
+                <a:solidFill>
+                  <a:srgbClr val="FFFFFF"/>
+                </a:solidFill>
+              </a14:hiddenFill>
+            </a:ext>
+          </a:extLst>
+        </p:spPr>
+      </p:pic>
+      <p:pic>
+        <p:nvPicPr>
+          <p:cNvPr id="1032" name="Picture 8" descr="Credits">
+            <a:extLst>
+              <a:ext uri="{FF2B5EF4-FFF2-40B4-BE49-F238E27FC236}">
+                <a16:creationId xmlns:a16="http://schemas.microsoft.com/office/drawing/2014/main" id="{31C343D6-9FD2-43EE-B32F-84EC095BC420}"/>
+              </a:ext>
+            </a:extLst>
+          </p:cNvPr>
+          <p:cNvPicPr>
+            <a:picLocks noChangeAspect="1" noChangeArrowheads="1"/>
+          </p:cNvPicPr>
+          <p:nvPr/>
+        </p:nvPicPr>
+        <p:blipFill>
+          <a:blip r:embed="rId6">
+            <a:extLst>
+              <a:ext uri="{28A0092B-C50C-407E-A947-70E740481C1C}">
+                <a14:useLocalDpi xmlns:a14="http://schemas.microsoft.com/office/drawing/2010/main" val="0"/>
+              </a:ext>
+            </a:extLst>
+          </a:blip>
+          <a:srcRect/>
+          <a:stretch>
+            <a:fillRect/>
+          </a:stretch>
+        </p:blipFill>
+        <p:spPr bwMode="auto">
+          <a:xfrm>
+            <a:off x="7107200" y="1808324"/>
+            <a:ext cx="496681" cy="372511"/>
+          </a:xfrm>
+          <a:prstGeom prst="rect">
+            <a:avLst/>
+          </a:prstGeom>
+          <a:noFill/>
+          <a:extLst>
+            <a:ext uri="{909E8E84-426E-40DD-AFC4-6F175D3DCCD1}">
+              <a14:hiddenFill xmlns:a14="http://schemas.microsoft.com/office/drawing/2010/main">
+                <a:solidFill>
+                  <a:srgbClr val="FFFFFF"/>
+                </a:solidFill>
+              </a14:hiddenFill>
+            </a:ext>
+          </a:extLst>
+        </p:spPr>
+      </p:pic>
+      <p:sp>
+        <p:nvSpPr>
+          <p:cNvPr id="26" name="Rectangle 25">
+            <a:extLst>
+              <a:ext uri="{FF2B5EF4-FFF2-40B4-BE49-F238E27FC236}">
+                <a16:creationId xmlns:a16="http://schemas.microsoft.com/office/drawing/2014/main" id="{1DEBA789-1465-4DB9-A04E-E27AFDA3C60E}"/>
+              </a:ext>
+            </a:extLst>
+          </p:cNvPr>
+          <p:cNvSpPr/>
+          <p:nvPr/>
+        </p:nvSpPr>
+        <p:spPr>
+          <a:xfrm>
+            <a:off x="7431735" y="3045961"/>
+            <a:ext cx="1062316" cy="2768901"/>
+          </a:xfrm>
+          <a:prstGeom prst="rect">
+            <a:avLst/>
+          </a:prstGeom>
+        </p:spPr>
+        <p:style>
+          <a:lnRef idx="2">
+            <a:schemeClr val="accent4">
+              <a:shade val="50000"/>
+            </a:schemeClr>
+          </a:lnRef>
+          <a:fillRef idx="1">
+            <a:schemeClr val="accent4"/>
+          </a:fillRef>
+          <a:effectRef idx="0">
+            <a:schemeClr val="accent4"/>
+          </a:effectRef>
+          <a:fontRef idx="minor">
+            <a:schemeClr val="lt1"/>
+          </a:fontRef>
+        </p:style>
+        <p:txBody>
+          <a:bodyPr rot="0" spcFirstLastPara="0" vertOverflow="overflow" horzOverflow="overflow" vert="horz" wrap="square" lIns="91440" tIns="45720" rIns="91440" bIns="45720" numCol="1" spcCol="0" rtlCol="0" fromWordArt="0" anchor="ctr" anchorCtr="0" forceAA="0" compatLnSpc="1">
+            <a:prstTxWarp prst="textNoShape">
+              <a:avLst/>
+            </a:prstTxWarp>
+            <a:noAutofit/>
+          </a:bodyPr>
+          <a:lstStyle/>
+          <a:p>
+            <a:pPr algn="ctr"/>
+            <a:r>
+              <a:rPr lang="pl-PL" sz="700" dirty="0">
+                <a:ln w="0"/>
+                <a:solidFill>
+                  <a:schemeClr val="tx1"/>
+                </a:solidFill>
+                <a:effectLst>
+                  <a:outerShdw blurRad="38100" dist="19050" dir="2700000" algn="tl" rotWithShape="0">
+                    <a:schemeClr val="dk1">
+                      <a:alpha val="40000"/>
+                    </a:schemeClr>
+                  </a:outerShdw>
+                </a:effectLst>
+              </a:rPr>
+              <a:t>Zakończenie gry różni się od tego jak grał gracz w pierwszym akcie. Przy normalnym przejściu gry (wybranie jednej postaci i próba rozkochania jej w sobie) dostaje się typowe zakończenie</a:t>
+            </a:r>
+            <a:r>
+              <a:rPr lang="en-US" sz="700" dirty="0">
+                <a:ln w="0"/>
+                <a:solidFill>
+                  <a:schemeClr val="tx1"/>
+                </a:solidFill>
+                <a:effectLst>
+                  <a:outerShdw blurRad="38100" dist="19050" dir="2700000" algn="tl" rotWithShape="0">
+                    <a:schemeClr val="dk1">
+                      <a:alpha val="40000"/>
+                    </a:schemeClr>
+                  </a:outerShdw>
+                </a:effectLst>
+              </a:rPr>
+              <a:t>, </a:t>
+            </a:r>
+            <a:r>
+              <a:rPr lang="pl-PL" sz="700" dirty="0">
+                <a:ln w="0"/>
+                <a:solidFill>
+                  <a:schemeClr val="tx1"/>
+                </a:solidFill>
+                <a:effectLst>
+                  <a:outerShdw blurRad="38100" dist="19050" dir="2700000" algn="tl" rotWithShape="0">
+                    <a:schemeClr val="dk1">
+                      <a:alpha val="40000"/>
+                    </a:schemeClr>
+                  </a:outerShdw>
+                </a:effectLst>
+              </a:rPr>
+              <a:t>opisane w akcie IV. Aby aktywować specjalny </a:t>
+            </a:r>
+            <a:r>
+              <a:rPr lang="en-US" sz="700" dirty="0">
+                <a:ln w="0"/>
+                <a:solidFill>
+                  <a:schemeClr val="tx1"/>
+                </a:solidFill>
+                <a:effectLst>
+                  <a:outerShdw blurRad="38100" dist="19050" dir="2700000" algn="tl" rotWithShape="0">
+                    <a:schemeClr val="dk1">
+                      <a:alpha val="40000"/>
+                    </a:schemeClr>
+                  </a:outerShdw>
+                </a:effectLst>
+              </a:rPr>
+              <a:t>ending</a:t>
+            </a:r>
+            <a:r>
+              <a:rPr lang="pl-PL" sz="700" dirty="0">
+                <a:ln w="0"/>
+                <a:solidFill>
+                  <a:schemeClr val="tx1"/>
+                </a:solidFill>
+                <a:effectLst>
+                  <a:outerShdw blurRad="38100" dist="19050" dir="2700000" algn="tl" rotWithShape="0">
+                    <a:schemeClr val="dk1">
+                      <a:alpha val="40000"/>
+                    </a:schemeClr>
+                  </a:outerShdw>
+                </a:effectLst>
+              </a:rPr>
+              <a:t> w akcie I należy kombinować z plikami zapisu gry, aby przejść wszystkie 3 możliwe ścieżki (spędzić czas z każdą z dziewczyn).</a:t>
+            </a:r>
+            <a:r>
+              <a:rPr lang="en-US" sz="700" dirty="0">
+                <a:ln w="0"/>
+                <a:solidFill>
+                  <a:schemeClr val="tx1"/>
+                </a:solidFill>
+                <a:effectLst>
+                  <a:outerShdw blurRad="38100" dist="19050" dir="2700000" algn="tl" rotWithShape="0">
+                    <a:schemeClr val="dk1">
+                      <a:alpha val="40000"/>
+                    </a:schemeClr>
+                  </a:outerShdw>
+                </a:effectLst>
+              </a:rPr>
+              <a:t> </a:t>
+            </a:r>
+            <a:r>
+              <a:rPr lang="pl-PL" sz="700" dirty="0">
+                <a:ln w="0"/>
+                <a:solidFill>
+                  <a:schemeClr val="tx1"/>
+                </a:solidFill>
+                <a:effectLst>
+                  <a:outerShdw blurRad="38100" dist="19050" dir="2700000" algn="tl" rotWithShape="0">
+                    <a:schemeClr val="dk1">
+                      <a:alpha val="40000"/>
+                    </a:schemeClr>
+                  </a:outerShdw>
+                </a:effectLst>
+              </a:rPr>
+              <a:t>Zakończenie polega na odblokowaniu specjalnego listu od twórców i słów uznania od </a:t>
+            </a:r>
+            <a:r>
+              <a:rPr lang="pl-PL" sz="700" dirty="0" err="1">
+                <a:ln w="0"/>
+                <a:solidFill>
+                  <a:schemeClr val="tx1"/>
+                </a:solidFill>
+                <a:effectLst>
+                  <a:outerShdw blurRad="38100" dist="19050" dir="2700000" algn="tl" rotWithShape="0">
+                    <a:schemeClr val="dk1">
+                      <a:alpha val="40000"/>
+                    </a:schemeClr>
+                  </a:outerShdw>
+                </a:effectLst>
+              </a:rPr>
+              <a:t>Sayori</a:t>
+            </a:r>
+            <a:r>
+              <a:rPr lang="pl-PL" sz="700" dirty="0">
+                <a:ln w="0"/>
+                <a:solidFill>
+                  <a:schemeClr val="tx1"/>
+                </a:solidFill>
+                <a:effectLst>
+                  <a:outerShdw blurRad="38100" dist="19050" dir="2700000" algn="tl" rotWithShape="0">
+                    <a:schemeClr val="dk1">
+                      <a:alpha val="40000"/>
+                    </a:schemeClr>
+                  </a:outerShdw>
+                </a:effectLst>
+              </a:rPr>
+              <a:t>.</a:t>
+            </a:r>
           </a:p>
         </p:txBody>
       </p:sp>

</xml_diff>